<commit_message>
docs: ✏️ fix diag
</commit_message>
<xml_diff>
--- a/docs/README/diagrams.pptx
+++ b/docs/README/diagrams.pptx
@@ -4116,11 +4116,7 @@
             </a:pPr>
             <a:r>
               <a:rPr lang="en-US" sz="1200" dirty="0" smtClean="0"/>
-              <a:t>: s</a:t>
-            </a:r>
-            <a:r>
-              <a:rPr lang="en-US" sz="1200" dirty="0" smtClean="0"/>
-              <a:t>ource</a:t>
+              <a:t>: source</a:t>
             </a:r>
           </a:p>
           <a:p>
@@ -4137,6 +4133,40 @@
           </a:p>
         </p:txBody>
       </p:sp>
+      <p:cxnSp>
+        <p:nvCxnSpPr>
+          <p:cNvPr id="31" name="Straight Connector 30"/>
+          <p:cNvCxnSpPr/>
+          <p:nvPr/>
+        </p:nvCxnSpPr>
+        <p:spPr>
+          <a:xfrm flipH="1" flipV="1">
+            <a:off x="10277301" y="1394315"/>
+            <a:ext cx="44792" cy="2558043"/>
+          </a:xfrm>
+          <a:prstGeom prst="line">
+            <a:avLst/>
+          </a:prstGeom>
+          <a:ln>
+            <a:headEnd type="triangle" w="med" len="med"/>
+            <a:tailEnd type="none" w="med" len="med"/>
+          </a:ln>
+        </p:spPr>
+        <p:style>
+          <a:lnRef idx="2">
+            <a:schemeClr val="accent3"/>
+          </a:lnRef>
+          <a:fillRef idx="0">
+            <a:schemeClr val="accent3"/>
+          </a:fillRef>
+          <a:effectRef idx="1">
+            <a:schemeClr val="accent3"/>
+          </a:effectRef>
+          <a:fontRef idx="minor">
+            <a:schemeClr val="tx1"/>
+          </a:fontRef>
+        </p:style>
+      </p:cxnSp>
     </p:spTree>
     <p:extLst>
       <p:ext uri="{BB962C8B-B14F-4D97-AF65-F5344CB8AC3E}">

</xml_diff>

<commit_message>
refactor: 💡 template 4/5
</commit_message>
<xml_diff>
--- a/docs/README/diagrams.pptx
+++ b/docs/README/diagrams.pptx
@@ -243,7 +243,7 @@
           <a:p>
             <a:fld id="{388BEFF6-CA1E-4F2C-AB17-C8AC986E5615}" type="datetimeFigureOut">
               <a:rPr lang="en-US" smtClean="0"/>
-              <a:t>3/9/2024</a:t>
+              <a:t>3/13/2024</a:t>
             </a:fld>
             <a:endParaRPr lang="en-US"/>
           </a:p>
@@ -413,7 +413,7 @@
           <a:p>
             <a:fld id="{388BEFF6-CA1E-4F2C-AB17-C8AC986E5615}" type="datetimeFigureOut">
               <a:rPr lang="en-US" smtClean="0"/>
-              <a:t>3/9/2024</a:t>
+              <a:t>3/13/2024</a:t>
             </a:fld>
             <a:endParaRPr lang="en-US"/>
           </a:p>
@@ -593,7 +593,7 @@
           <a:p>
             <a:fld id="{388BEFF6-CA1E-4F2C-AB17-C8AC986E5615}" type="datetimeFigureOut">
               <a:rPr lang="en-US" smtClean="0"/>
-              <a:t>3/9/2024</a:t>
+              <a:t>3/13/2024</a:t>
             </a:fld>
             <a:endParaRPr lang="en-US"/>
           </a:p>
@@ -763,7 +763,7 @@
           <a:p>
             <a:fld id="{388BEFF6-CA1E-4F2C-AB17-C8AC986E5615}" type="datetimeFigureOut">
               <a:rPr lang="en-US" smtClean="0"/>
-              <a:t>3/9/2024</a:t>
+              <a:t>3/13/2024</a:t>
             </a:fld>
             <a:endParaRPr lang="en-US"/>
           </a:p>
@@ -1009,7 +1009,7 @@
           <a:p>
             <a:fld id="{388BEFF6-CA1E-4F2C-AB17-C8AC986E5615}" type="datetimeFigureOut">
               <a:rPr lang="en-US" smtClean="0"/>
-              <a:t>3/9/2024</a:t>
+              <a:t>3/13/2024</a:t>
             </a:fld>
             <a:endParaRPr lang="en-US"/>
           </a:p>
@@ -1241,7 +1241,7 @@
           <a:p>
             <a:fld id="{388BEFF6-CA1E-4F2C-AB17-C8AC986E5615}" type="datetimeFigureOut">
               <a:rPr lang="en-US" smtClean="0"/>
-              <a:t>3/9/2024</a:t>
+              <a:t>3/13/2024</a:t>
             </a:fld>
             <a:endParaRPr lang="en-US"/>
           </a:p>
@@ -1608,7 +1608,7 @@
           <a:p>
             <a:fld id="{388BEFF6-CA1E-4F2C-AB17-C8AC986E5615}" type="datetimeFigureOut">
               <a:rPr lang="en-US" smtClean="0"/>
-              <a:t>3/9/2024</a:t>
+              <a:t>3/13/2024</a:t>
             </a:fld>
             <a:endParaRPr lang="en-US"/>
           </a:p>
@@ -1726,7 +1726,7 @@
           <a:p>
             <a:fld id="{388BEFF6-CA1E-4F2C-AB17-C8AC986E5615}" type="datetimeFigureOut">
               <a:rPr lang="en-US" smtClean="0"/>
-              <a:t>3/9/2024</a:t>
+              <a:t>3/13/2024</a:t>
             </a:fld>
             <a:endParaRPr lang="en-US"/>
           </a:p>
@@ -1821,7 +1821,7 @@
           <a:p>
             <a:fld id="{388BEFF6-CA1E-4F2C-AB17-C8AC986E5615}" type="datetimeFigureOut">
               <a:rPr lang="en-US" smtClean="0"/>
-              <a:t>3/9/2024</a:t>
+              <a:t>3/13/2024</a:t>
             </a:fld>
             <a:endParaRPr lang="en-US"/>
           </a:p>
@@ -2098,7 +2098,7 @@
           <a:p>
             <a:fld id="{388BEFF6-CA1E-4F2C-AB17-C8AC986E5615}" type="datetimeFigureOut">
               <a:rPr lang="en-US" smtClean="0"/>
-              <a:t>3/9/2024</a:t>
+              <a:t>3/13/2024</a:t>
             </a:fld>
             <a:endParaRPr lang="en-US"/>
           </a:p>
@@ -2351,7 +2351,7 @@
           <a:p>
             <a:fld id="{388BEFF6-CA1E-4F2C-AB17-C8AC986E5615}" type="datetimeFigureOut">
               <a:rPr lang="en-US" smtClean="0"/>
-              <a:t>3/9/2024</a:t>
+              <a:t>3/13/2024</a:t>
             </a:fld>
             <a:endParaRPr lang="en-US"/>
           </a:p>
@@ -2564,7 +2564,7 @@
           <a:p>
             <a:fld id="{388BEFF6-CA1E-4F2C-AB17-C8AC986E5615}" type="datetimeFigureOut">
               <a:rPr lang="en-US" smtClean="0"/>
-              <a:t>3/9/2024</a:t>
+              <a:t>3/13/2024</a:t>
             </a:fld>
             <a:endParaRPr lang="en-US"/>
           </a:p>
@@ -3301,8 +3301,8 @@
           <a:p>
             <a:pPr algn="ctr"/>
             <a:r>
-              <a:rPr lang="en-US" dirty="0" err="1" smtClean="0"/>
-              <a:t>My_game</a:t>
+              <a:rPr lang="en-US" dirty="0" smtClean="0"/>
+              <a:t>game</a:t>
             </a:r>
             <a:r>
               <a:rPr lang="en-US" dirty="0"/>
@@ -4144,7 +4144,7 @@
             <a:pPr algn="ctr"/>
             <a:r>
               <a:rPr lang="en-US" dirty="0" smtClean="0"/>
-              <a:t>My_level1</a:t>
+              <a:t>level2</a:t>
             </a:r>
             <a:r>
               <a:rPr lang="en-US" dirty="0"/>
@@ -4235,7 +4235,7 @@
             <a:pPr algn="ctr"/>
             <a:r>
               <a:rPr lang="en-US" dirty="0" smtClean="0"/>
-              <a:t>core</a:t>
+              <a:t>engine</a:t>
             </a:r>
             <a:r>
               <a:rPr lang="en-US" dirty="0"/>
@@ -4325,12 +4325,8 @@
           <a:p>
             <a:pPr algn="ctr"/>
             <a:r>
-              <a:rPr lang="en-US" dirty="0" err="1" smtClean="0"/>
-              <a:t>My_com</a:t>
-            </a:r>
-            <a:r>
               <a:rPr lang="en-US" dirty="0" smtClean="0"/>
-              <a:t>.</a:t>
+              <a:t>level1.</a:t>
             </a:r>
             <a:r>
               <a:rPr lang="en-US" dirty="0"/>
@@ -4359,6 +4355,101 @@
           <a:xfrm flipV="1">
             <a:off x="9152193" y="2521552"/>
             <a:ext cx="0" cy="267009"/>
+          </a:xfrm>
+          <a:prstGeom prst="line">
+            <a:avLst/>
+          </a:prstGeom>
+          <a:ln>
+            <a:headEnd type="triangle" w="med" len="med"/>
+            <a:tailEnd type="none" w="med" len="med"/>
+          </a:ln>
+        </p:spPr>
+        <p:style>
+          <a:lnRef idx="2">
+            <a:schemeClr val="accent3"/>
+          </a:lnRef>
+          <a:fillRef idx="0">
+            <a:schemeClr val="accent3"/>
+          </a:fillRef>
+          <a:effectRef idx="1">
+            <a:schemeClr val="accent3"/>
+          </a:effectRef>
+          <a:fontRef idx="minor">
+            <a:schemeClr val="tx1"/>
+          </a:fontRef>
+        </p:style>
+      </p:cxnSp>
+      <p:sp>
+        <p:nvSpPr>
+          <p:cNvPr id="31" name="Rectangle 30"/>
+          <p:cNvSpPr/>
+          <p:nvPr/>
+        </p:nvSpPr>
+        <p:spPr>
+          <a:xfrm>
+            <a:off x="8564732" y="4005111"/>
+            <a:ext cx="1280160" cy="731520"/>
+          </a:xfrm>
+          <a:prstGeom prst="rect">
+            <a:avLst/>
+          </a:prstGeom>
+        </p:spPr>
+        <p:style>
+          <a:lnRef idx="2">
+            <a:schemeClr val="accent1">
+              <a:shade val="50000"/>
+            </a:schemeClr>
+          </a:lnRef>
+          <a:fillRef idx="1">
+            <a:schemeClr val="accent1"/>
+          </a:fillRef>
+          <a:effectRef idx="0">
+            <a:schemeClr val="accent1"/>
+          </a:effectRef>
+          <a:fontRef idx="minor">
+            <a:schemeClr val="lt1"/>
+          </a:fontRef>
+        </p:style>
+        <p:txBody>
+          <a:bodyPr rtlCol="0" anchor="ctr"/>
+          <a:lstStyle/>
+          <a:p>
+            <a:pPr algn="ctr"/>
+            <a:r>
+              <a:rPr lang="en-US" dirty="0" err="1" smtClean="0"/>
+              <a:t>rllight</a:t>
+            </a:r>
+            <a:r>
+              <a:rPr lang="en-US" dirty="0" smtClean="0"/>
+              <a:t> </a:t>
+            </a:r>
+            <a:r>
+              <a:rPr lang="en-US" dirty="0" smtClean="0"/>
+              <a:t/>
+            </a:r>
+            <a:br>
+              <a:rPr lang="en-US" dirty="0" smtClean="0"/>
+            </a:br>
+            <a:r>
+              <a:rPr lang="en-US" dirty="0" smtClean="0"/>
+              <a:t>*.h</a:t>
+            </a:r>
+            <a:endParaRPr lang="en-US" dirty="0"/>
+          </a:p>
+        </p:txBody>
+      </p:sp>
+      <p:cxnSp>
+        <p:nvCxnSpPr>
+          <p:cNvPr id="43" name="Straight Connector 42"/>
+          <p:cNvCxnSpPr>
+            <a:stCxn id="31" idx="0"/>
+          </p:cNvCxnSpPr>
+          <p:nvPr/>
+        </p:nvCxnSpPr>
+        <p:spPr>
+          <a:xfrm flipH="1" flipV="1">
+            <a:off x="9175485" y="3531776"/>
+            <a:ext cx="29327" cy="473335"/>
           </a:xfrm>
           <a:prstGeom prst="line">
             <a:avLst/>

</xml_diff>

<commit_message>
Revert "refactor: 💡 template 4/5"
This reverts commit a9407794
</commit_message>
<xml_diff>
--- a/docs/README/diagrams.pptx
+++ b/docs/README/diagrams.pptx
@@ -243,7 +243,7 @@
           <a:p>
             <a:fld id="{388BEFF6-CA1E-4F2C-AB17-C8AC986E5615}" type="datetimeFigureOut">
               <a:rPr lang="en-US" smtClean="0"/>
-              <a:t>3/13/2024</a:t>
+              <a:t>3/9/2024</a:t>
             </a:fld>
             <a:endParaRPr lang="en-US"/>
           </a:p>
@@ -413,7 +413,7 @@
           <a:p>
             <a:fld id="{388BEFF6-CA1E-4F2C-AB17-C8AC986E5615}" type="datetimeFigureOut">
               <a:rPr lang="en-US" smtClean="0"/>
-              <a:t>3/13/2024</a:t>
+              <a:t>3/9/2024</a:t>
             </a:fld>
             <a:endParaRPr lang="en-US"/>
           </a:p>
@@ -593,7 +593,7 @@
           <a:p>
             <a:fld id="{388BEFF6-CA1E-4F2C-AB17-C8AC986E5615}" type="datetimeFigureOut">
               <a:rPr lang="en-US" smtClean="0"/>
-              <a:t>3/13/2024</a:t>
+              <a:t>3/9/2024</a:t>
             </a:fld>
             <a:endParaRPr lang="en-US"/>
           </a:p>
@@ -763,7 +763,7 @@
           <a:p>
             <a:fld id="{388BEFF6-CA1E-4F2C-AB17-C8AC986E5615}" type="datetimeFigureOut">
               <a:rPr lang="en-US" smtClean="0"/>
-              <a:t>3/13/2024</a:t>
+              <a:t>3/9/2024</a:t>
             </a:fld>
             <a:endParaRPr lang="en-US"/>
           </a:p>
@@ -1009,7 +1009,7 @@
           <a:p>
             <a:fld id="{388BEFF6-CA1E-4F2C-AB17-C8AC986E5615}" type="datetimeFigureOut">
               <a:rPr lang="en-US" smtClean="0"/>
-              <a:t>3/13/2024</a:t>
+              <a:t>3/9/2024</a:t>
             </a:fld>
             <a:endParaRPr lang="en-US"/>
           </a:p>
@@ -1241,7 +1241,7 @@
           <a:p>
             <a:fld id="{388BEFF6-CA1E-4F2C-AB17-C8AC986E5615}" type="datetimeFigureOut">
               <a:rPr lang="en-US" smtClean="0"/>
-              <a:t>3/13/2024</a:t>
+              <a:t>3/9/2024</a:t>
             </a:fld>
             <a:endParaRPr lang="en-US"/>
           </a:p>
@@ -1608,7 +1608,7 @@
           <a:p>
             <a:fld id="{388BEFF6-CA1E-4F2C-AB17-C8AC986E5615}" type="datetimeFigureOut">
               <a:rPr lang="en-US" smtClean="0"/>
-              <a:t>3/13/2024</a:t>
+              <a:t>3/9/2024</a:t>
             </a:fld>
             <a:endParaRPr lang="en-US"/>
           </a:p>
@@ -1726,7 +1726,7 @@
           <a:p>
             <a:fld id="{388BEFF6-CA1E-4F2C-AB17-C8AC986E5615}" type="datetimeFigureOut">
               <a:rPr lang="en-US" smtClean="0"/>
-              <a:t>3/13/2024</a:t>
+              <a:t>3/9/2024</a:t>
             </a:fld>
             <a:endParaRPr lang="en-US"/>
           </a:p>
@@ -1821,7 +1821,7 @@
           <a:p>
             <a:fld id="{388BEFF6-CA1E-4F2C-AB17-C8AC986E5615}" type="datetimeFigureOut">
               <a:rPr lang="en-US" smtClean="0"/>
-              <a:t>3/13/2024</a:t>
+              <a:t>3/9/2024</a:t>
             </a:fld>
             <a:endParaRPr lang="en-US"/>
           </a:p>
@@ -2098,7 +2098,7 @@
           <a:p>
             <a:fld id="{388BEFF6-CA1E-4F2C-AB17-C8AC986E5615}" type="datetimeFigureOut">
               <a:rPr lang="en-US" smtClean="0"/>
-              <a:t>3/13/2024</a:t>
+              <a:t>3/9/2024</a:t>
             </a:fld>
             <a:endParaRPr lang="en-US"/>
           </a:p>
@@ -2351,7 +2351,7 @@
           <a:p>
             <a:fld id="{388BEFF6-CA1E-4F2C-AB17-C8AC986E5615}" type="datetimeFigureOut">
               <a:rPr lang="en-US" smtClean="0"/>
-              <a:t>3/13/2024</a:t>
+              <a:t>3/9/2024</a:t>
             </a:fld>
             <a:endParaRPr lang="en-US"/>
           </a:p>
@@ -2564,7 +2564,7 @@
           <a:p>
             <a:fld id="{388BEFF6-CA1E-4F2C-AB17-C8AC986E5615}" type="datetimeFigureOut">
               <a:rPr lang="en-US" smtClean="0"/>
-              <a:t>3/13/2024</a:t>
+              <a:t>3/9/2024</a:t>
             </a:fld>
             <a:endParaRPr lang="en-US"/>
           </a:p>
@@ -3301,8 +3301,8 @@
           <a:p>
             <a:pPr algn="ctr"/>
             <a:r>
-              <a:rPr lang="en-US" dirty="0" smtClean="0"/>
-              <a:t>game</a:t>
+              <a:rPr lang="en-US" dirty="0" err="1" smtClean="0"/>
+              <a:t>My_game</a:t>
             </a:r>
             <a:r>
               <a:rPr lang="en-US" dirty="0"/>
@@ -4144,7 +4144,7 @@
             <a:pPr algn="ctr"/>
             <a:r>
               <a:rPr lang="en-US" dirty="0" smtClean="0"/>
-              <a:t>level2</a:t>
+              <a:t>My_level1</a:t>
             </a:r>
             <a:r>
               <a:rPr lang="en-US" dirty="0"/>
@@ -4235,7 +4235,7 @@
             <a:pPr algn="ctr"/>
             <a:r>
               <a:rPr lang="en-US" dirty="0" smtClean="0"/>
-              <a:t>engine</a:t>
+              <a:t>core</a:t>
             </a:r>
             <a:r>
               <a:rPr lang="en-US" dirty="0"/>
@@ -4325,8 +4325,12 @@
           <a:p>
             <a:pPr algn="ctr"/>
             <a:r>
+              <a:rPr lang="en-US" dirty="0" err="1" smtClean="0"/>
+              <a:t>My_com</a:t>
+            </a:r>
+            <a:r>
               <a:rPr lang="en-US" dirty="0" smtClean="0"/>
-              <a:t>level1.</a:t>
+              <a:t>.</a:t>
             </a:r>
             <a:r>
               <a:rPr lang="en-US" dirty="0"/>
@@ -4355,101 +4359,6 @@
           <a:xfrm flipV="1">
             <a:off x="9152193" y="2521552"/>
             <a:ext cx="0" cy="267009"/>
-          </a:xfrm>
-          <a:prstGeom prst="line">
-            <a:avLst/>
-          </a:prstGeom>
-          <a:ln>
-            <a:headEnd type="triangle" w="med" len="med"/>
-            <a:tailEnd type="none" w="med" len="med"/>
-          </a:ln>
-        </p:spPr>
-        <p:style>
-          <a:lnRef idx="2">
-            <a:schemeClr val="accent3"/>
-          </a:lnRef>
-          <a:fillRef idx="0">
-            <a:schemeClr val="accent3"/>
-          </a:fillRef>
-          <a:effectRef idx="1">
-            <a:schemeClr val="accent3"/>
-          </a:effectRef>
-          <a:fontRef idx="minor">
-            <a:schemeClr val="tx1"/>
-          </a:fontRef>
-        </p:style>
-      </p:cxnSp>
-      <p:sp>
-        <p:nvSpPr>
-          <p:cNvPr id="31" name="Rectangle 30"/>
-          <p:cNvSpPr/>
-          <p:nvPr/>
-        </p:nvSpPr>
-        <p:spPr>
-          <a:xfrm>
-            <a:off x="8564732" y="4005111"/>
-            <a:ext cx="1280160" cy="731520"/>
-          </a:xfrm>
-          <a:prstGeom prst="rect">
-            <a:avLst/>
-          </a:prstGeom>
-        </p:spPr>
-        <p:style>
-          <a:lnRef idx="2">
-            <a:schemeClr val="accent1">
-              <a:shade val="50000"/>
-            </a:schemeClr>
-          </a:lnRef>
-          <a:fillRef idx="1">
-            <a:schemeClr val="accent1"/>
-          </a:fillRef>
-          <a:effectRef idx="0">
-            <a:schemeClr val="accent1"/>
-          </a:effectRef>
-          <a:fontRef idx="minor">
-            <a:schemeClr val="lt1"/>
-          </a:fontRef>
-        </p:style>
-        <p:txBody>
-          <a:bodyPr rtlCol="0" anchor="ctr"/>
-          <a:lstStyle/>
-          <a:p>
-            <a:pPr algn="ctr"/>
-            <a:r>
-              <a:rPr lang="en-US" dirty="0" err="1" smtClean="0"/>
-              <a:t>rllight</a:t>
-            </a:r>
-            <a:r>
-              <a:rPr lang="en-US" dirty="0" smtClean="0"/>
-              <a:t> </a:t>
-            </a:r>
-            <a:r>
-              <a:rPr lang="en-US" dirty="0" smtClean="0"/>
-              <a:t/>
-            </a:r>
-            <a:br>
-              <a:rPr lang="en-US" dirty="0" smtClean="0"/>
-            </a:br>
-            <a:r>
-              <a:rPr lang="en-US" dirty="0" smtClean="0"/>
-              <a:t>*.h</a:t>
-            </a:r>
-            <a:endParaRPr lang="en-US" dirty="0"/>
-          </a:p>
-        </p:txBody>
-      </p:sp>
-      <p:cxnSp>
-        <p:nvCxnSpPr>
-          <p:cNvPr id="43" name="Straight Connector 42"/>
-          <p:cNvCxnSpPr>
-            <a:stCxn id="31" idx="0"/>
-          </p:cNvCxnSpPr>
-          <p:nvPr/>
-        </p:nvCxnSpPr>
-        <p:spPr>
-          <a:xfrm flipH="1" flipV="1">
-            <a:off x="9175485" y="3531776"/>
-            <a:ext cx="29327" cy="473335"/>
           </a:xfrm>
           <a:prstGeom prst="line">
             <a:avLst/>

</xml_diff>

<commit_message>
docs: ✏️ class diagram
</commit_message>
<xml_diff>
--- a/docs/README/diagrams.pptx
+++ b/docs/README/diagrams.pptx
@@ -6,6 +6,7 @@
   </p:sldMasterIdLst>
   <p:sldIdLst>
     <p:sldId id="256" r:id="rId2"/>
+    <p:sldId id="257" r:id="rId3"/>
   </p:sldIdLst>
   <p:sldSz cx="12192000" cy="6858000"/>
   <p:notesSz cx="6858000" cy="9144000"/>
@@ -243,7 +244,7 @@
           <a:p>
             <a:fld id="{388BEFF6-CA1E-4F2C-AB17-C8AC986E5615}" type="datetimeFigureOut">
               <a:rPr lang="en-US" smtClean="0"/>
-              <a:t>3/9/2024</a:t>
+              <a:t>4/2/2024</a:t>
             </a:fld>
             <a:endParaRPr lang="en-US"/>
           </a:p>
@@ -413,7 +414,7 @@
           <a:p>
             <a:fld id="{388BEFF6-CA1E-4F2C-AB17-C8AC986E5615}" type="datetimeFigureOut">
               <a:rPr lang="en-US" smtClean="0"/>
-              <a:t>3/9/2024</a:t>
+              <a:t>4/2/2024</a:t>
             </a:fld>
             <a:endParaRPr lang="en-US"/>
           </a:p>
@@ -593,7 +594,7 @@
           <a:p>
             <a:fld id="{388BEFF6-CA1E-4F2C-AB17-C8AC986E5615}" type="datetimeFigureOut">
               <a:rPr lang="en-US" smtClean="0"/>
-              <a:t>3/9/2024</a:t>
+              <a:t>4/2/2024</a:t>
             </a:fld>
             <a:endParaRPr lang="en-US"/>
           </a:p>
@@ -763,7 +764,7 @@
           <a:p>
             <a:fld id="{388BEFF6-CA1E-4F2C-AB17-C8AC986E5615}" type="datetimeFigureOut">
               <a:rPr lang="en-US" smtClean="0"/>
-              <a:t>3/9/2024</a:t>
+              <a:t>4/2/2024</a:t>
             </a:fld>
             <a:endParaRPr lang="en-US"/>
           </a:p>
@@ -1009,7 +1010,7 @@
           <a:p>
             <a:fld id="{388BEFF6-CA1E-4F2C-AB17-C8AC986E5615}" type="datetimeFigureOut">
               <a:rPr lang="en-US" smtClean="0"/>
-              <a:t>3/9/2024</a:t>
+              <a:t>4/2/2024</a:t>
             </a:fld>
             <a:endParaRPr lang="en-US"/>
           </a:p>
@@ -1241,7 +1242,7 @@
           <a:p>
             <a:fld id="{388BEFF6-CA1E-4F2C-AB17-C8AC986E5615}" type="datetimeFigureOut">
               <a:rPr lang="en-US" smtClean="0"/>
-              <a:t>3/9/2024</a:t>
+              <a:t>4/2/2024</a:t>
             </a:fld>
             <a:endParaRPr lang="en-US"/>
           </a:p>
@@ -1608,7 +1609,7 @@
           <a:p>
             <a:fld id="{388BEFF6-CA1E-4F2C-AB17-C8AC986E5615}" type="datetimeFigureOut">
               <a:rPr lang="en-US" smtClean="0"/>
-              <a:t>3/9/2024</a:t>
+              <a:t>4/2/2024</a:t>
             </a:fld>
             <a:endParaRPr lang="en-US"/>
           </a:p>
@@ -1726,7 +1727,7 @@
           <a:p>
             <a:fld id="{388BEFF6-CA1E-4F2C-AB17-C8AC986E5615}" type="datetimeFigureOut">
               <a:rPr lang="en-US" smtClean="0"/>
-              <a:t>3/9/2024</a:t>
+              <a:t>4/2/2024</a:t>
             </a:fld>
             <a:endParaRPr lang="en-US"/>
           </a:p>
@@ -1821,7 +1822,7 @@
           <a:p>
             <a:fld id="{388BEFF6-CA1E-4F2C-AB17-C8AC986E5615}" type="datetimeFigureOut">
               <a:rPr lang="en-US" smtClean="0"/>
-              <a:t>3/9/2024</a:t>
+              <a:t>4/2/2024</a:t>
             </a:fld>
             <a:endParaRPr lang="en-US"/>
           </a:p>
@@ -2098,7 +2099,7 @@
           <a:p>
             <a:fld id="{388BEFF6-CA1E-4F2C-AB17-C8AC986E5615}" type="datetimeFigureOut">
               <a:rPr lang="en-US" smtClean="0"/>
-              <a:t>3/9/2024</a:t>
+              <a:t>4/2/2024</a:t>
             </a:fld>
             <a:endParaRPr lang="en-US"/>
           </a:p>
@@ -2351,7 +2352,7 @@
           <a:p>
             <a:fld id="{388BEFF6-CA1E-4F2C-AB17-C8AC986E5615}" type="datetimeFigureOut">
               <a:rPr lang="en-US" smtClean="0"/>
-              <a:t>3/9/2024</a:t>
+              <a:t>4/2/2024</a:t>
             </a:fld>
             <a:endParaRPr lang="en-US"/>
           </a:p>
@@ -2564,7 +2565,7 @@
           <a:p>
             <a:fld id="{388BEFF6-CA1E-4F2C-AB17-C8AC986E5615}" type="datetimeFigureOut">
               <a:rPr lang="en-US" smtClean="0"/>
-              <a:t>3/9/2024</a:t>
+              <a:t>4/2/2024</a:t>
             </a:fld>
             <a:endParaRPr lang="en-US"/>
           </a:p>
@@ -4403,6 +4404,1205 @@
 </p:sld>
 </file>
 
+<file path=ppt/slides/slide2.xml><?xml version="1.0" encoding="utf-8"?>
+<p:sld xmlns:a="http://schemas.openxmlformats.org/drawingml/2006/main" xmlns:r="http://schemas.openxmlformats.org/officeDocument/2006/relationships" xmlns:p="http://schemas.openxmlformats.org/presentationml/2006/main">
+  <p:cSld>
+    <p:spTree>
+      <p:nvGrpSpPr>
+        <p:cNvPr id="1" name=""/>
+        <p:cNvGrpSpPr/>
+        <p:nvPr/>
+      </p:nvGrpSpPr>
+      <p:grpSpPr>
+        <a:xfrm>
+          <a:off x="0" y="0"/>
+          <a:ext cx="0" cy="0"/>
+          <a:chOff x="0" y="0"/>
+          <a:chExt cx="0" cy="0"/>
+        </a:xfrm>
+      </p:grpSpPr>
+      <p:sp>
+        <p:nvSpPr>
+          <p:cNvPr id="31" name="Rectangle 30"/>
+          <p:cNvSpPr/>
+          <p:nvPr/>
+        </p:nvSpPr>
+        <p:spPr>
+          <a:xfrm>
+            <a:off x="537579" y="629970"/>
+            <a:ext cx="2932018" cy="731520"/>
+          </a:xfrm>
+          <a:prstGeom prst="rect">
+            <a:avLst/>
+          </a:prstGeom>
+        </p:spPr>
+        <p:style>
+          <a:lnRef idx="2">
+            <a:schemeClr val="accent2">
+              <a:shade val="50000"/>
+            </a:schemeClr>
+          </a:lnRef>
+          <a:fillRef idx="1">
+            <a:schemeClr val="accent2"/>
+          </a:fillRef>
+          <a:effectRef idx="0">
+            <a:schemeClr val="accent2"/>
+          </a:effectRef>
+          <a:fontRef idx="minor">
+            <a:schemeClr val="lt1"/>
+          </a:fontRef>
+        </p:style>
+        <p:txBody>
+          <a:bodyPr rtlCol="0" anchor="ctr"/>
+          <a:lstStyle/>
+          <a:p>
+            <a:pPr algn="ctr"/>
+            <a:r>
+              <a:rPr lang="en-US" dirty="0"/>
+              <a:t>main.cpp</a:t>
+            </a:r>
+            <a:endParaRPr lang="en-US" dirty="0" smtClean="0"/>
+          </a:p>
+        </p:txBody>
+      </p:sp>
+      <p:sp>
+        <p:nvSpPr>
+          <p:cNvPr id="43" name="Rectangle 42"/>
+          <p:cNvSpPr/>
+          <p:nvPr/>
+        </p:nvSpPr>
+        <p:spPr>
+          <a:xfrm>
+            <a:off x="532238" y="4971265"/>
+            <a:ext cx="2926595" cy="731520"/>
+          </a:xfrm>
+          <a:prstGeom prst="rect">
+            <a:avLst/>
+          </a:prstGeom>
+        </p:spPr>
+        <p:style>
+          <a:lnRef idx="2">
+            <a:schemeClr val="accent1">
+              <a:shade val="50000"/>
+            </a:schemeClr>
+          </a:lnRef>
+          <a:fillRef idx="1">
+            <a:schemeClr val="accent1"/>
+          </a:fillRef>
+          <a:effectRef idx="0">
+            <a:schemeClr val="accent1"/>
+          </a:effectRef>
+          <a:fontRef idx="minor">
+            <a:schemeClr val="lt1"/>
+          </a:fontRef>
+        </p:style>
+        <p:txBody>
+          <a:bodyPr rtlCol="0" anchor="ctr"/>
+          <a:lstStyle/>
+          <a:p>
+            <a:pPr algn="ctr"/>
+            <a:r>
+              <a:rPr lang="en-US" dirty="0" err="1"/>
+              <a:t>loader_unrealthirdperson.c</a:t>
+            </a:r>
+            <a:endParaRPr lang="en-US" dirty="0" smtClean="0"/>
+          </a:p>
+        </p:txBody>
+      </p:sp>
+      <p:sp>
+        <p:nvSpPr>
+          <p:cNvPr id="44" name="Rectangle 43"/>
+          <p:cNvSpPr/>
+          <p:nvPr/>
+        </p:nvSpPr>
+        <p:spPr>
+          <a:xfrm>
+            <a:off x="526815" y="3990142"/>
+            <a:ext cx="2932018" cy="731520"/>
+          </a:xfrm>
+          <a:prstGeom prst="rect">
+            <a:avLst/>
+          </a:prstGeom>
+        </p:spPr>
+        <p:style>
+          <a:lnRef idx="2">
+            <a:schemeClr val="accent1">
+              <a:shade val="50000"/>
+            </a:schemeClr>
+          </a:lnRef>
+          <a:fillRef idx="1">
+            <a:schemeClr val="accent1"/>
+          </a:fillRef>
+          <a:effectRef idx="0">
+            <a:schemeClr val="accent1"/>
+          </a:effectRef>
+          <a:fontRef idx="minor">
+            <a:schemeClr val="lt1"/>
+          </a:fontRef>
+        </p:style>
+        <p:txBody>
+          <a:bodyPr rtlCol="0" anchor="ctr"/>
+          <a:lstStyle/>
+          <a:p>
+            <a:pPr algn="ctr"/>
+            <a:r>
+              <a:rPr lang="en-US" dirty="0" err="1"/>
+              <a:t>screen_unrealthirdperson.c</a:t>
+            </a:r>
+            <a:endParaRPr lang="en-US" dirty="0" smtClean="0"/>
+          </a:p>
+        </p:txBody>
+      </p:sp>
+      <p:sp>
+        <p:nvSpPr>
+          <p:cNvPr id="46" name="Rectangle 45"/>
+          <p:cNvSpPr/>
+          <p:nvPr/>
+        </p:nvSpPr>
+        <p:spPr>
+          <a:xfrm>
+            <a:off x="537579" y="2053052"/>
+            <a:ext cx="2932018" cy="731520"/>
+          </a:xfrm>
+          <a:prstGeom prst="rect">
+            <a:avLst/>
+          </a:prstGeom>
+        </p:spPr>
+        <p:style>
+          <a:lnRef idx="2">
+            <a:schemeClr val="accent1">
+              <a:shade val="50000"/>
+            </a:schemeClr>
+          </a:lnRef>
+          <a:fillRef idx="1">
+            <a:schemeClr val="accent1"/>
+          </a:fillRef>
+          <a:effectRef idx="0">
+            <a:schemeClr val="accent1"/>
+          </a:effectRef>
+          <a:fontRef idx="minor">
+            <a:schemeClr val="lt1"/>
+          </a:fontRef>
+        </p:style>
+        <p:txBody>
+          <a:bodyPr rtlCol="0" anchor="ctr"/>
+          <a:lstStyle/>
+          <a:p>
+            <a:pPr algn="ctr"/>
+            <a:r>
+              <a:rPr lang="en-US" dirty="0" err="1"/>
+              <a:t>game.c</a:t>
+            </a:r>
+            <a:endParaRPr lang="en-US" dirty="0" smtClean="0"/>
+          </a:p>
+        </p:txBody>
+      </p:sp>
+      <p:sp>
+        <p:nvSpPr>
+          <p:cNvPr id="47" name="Rectangle 46"/>
+          <p:cNvSpPr/>
+          <p:nvPr/>
+        </p:nvSpPr>
+        <p:spPr>
+          <a:xfrm>
+            <a:off x="8110761" y="4370669"/>
+            <a:ext cx="2932018" cy="731520"/>
+          </a:xfrm>
+          <a:prstGeom prst="rect">
+            <a:avLst/>
+          </a:prstGeom>
+        </p:spPr>
+        <p:style>
+          <a:lnRef idx="2">
+            <a:schemeClr val="accent1">
+              <a:shade val="50000"/>
+            </a:schemeClr>
+          </a:lnRef>
+          <a:fillRef idx="1">
+            <a:schemeClr val="accent1"/>
+          </a:fillRef>
+          <a:effectRef idx="0">
+            <a:schemeClr val="accent1"/>
+          </a:effectRef>
+          <a:fontRef idx="minor">
+            <a:schemeClr val="lt1"/>
+          </a:fontRef>
+        </p:style>
+        <p:txBody>
+          <a:bodyPr rtlCol="0" anchor="ctr"/>
+          <a:lstStyle/>
+          <a:p>
+            <a:pPr algn="ctr"/>
+            <a:r>
+              <a:rPr lang="en-US" dirty="0" err="1"/>
+              <a:t>assets.c</a:t>
+            </a:r>
+            <a:endParaRPr lang="en-US" dirty="0" smtClean="0"/>
+          </a:p>
+        </p:txBody>
+      </p:sp>
+      <p:sp>
+        <p:nvSpPr>
+          <p:cNvPr id="49" name="Rectangle 48"/>
+          <p:cNvSpPr/>
+          <p:nvPr/>
+        </p:nvSpPr>
+        <p:spPr>
+          <a:xfrm>
+            <a:off x="8759153" y="3273493"/>
+            <a:ext cx="2932018" cy="731520"/>
+          </a:xfrm>
+          <a:prstGeom prst="rect">
+            <a:avLst/>
+          </a:prstGeom>
+        </p:spPr>
+        <p:style>
+          <a:lnRef idx="2">
+            <a:schemeClr val="accent1">
+              <a:shade val="50000"/>
+            </a:schemeClr>
+          </a:lnRef>
+          <a:fillRef idx="1">
+            <a:schemeClr val="accent1"/>
+          </a:fillRef>
+          <a:effectRef idx="0">
+            <a:schemeClr val="accent1"/>
+          </a:effectRef>
+          <a:fontRef idx="minor">
+            <a:schemeClr val="lt1"/>
+          </a:fontRef>
+        </p:style>
+        <p:txBody>
+          <a:bodyPr rtlCol="0" anchor="ctr"/>
+          <a:lstStyle/>
+          <a:p>
+            <a:pPr algn="ctr"/>
+            <a:r>
+              <a:rPr lang="en-US" dirty="0" err="1"/>
+              <a:t>control.c</a:t>
+            </a:r>
+            <a:endParaRPr lang="en-US" dirty="0" smtClean="0"/>
+          </a:p>
+        </p:txBody>
+      </p:sp>
+      <p:sp>
+        <p:nvSpPr>
+          <p:cNvPr id="50" name="Rectangle 49"/>
+          <p:cNvSpPr/>
+          <p:nvPr/>
+        </p:nvSpPr>
+        <p:spPr>
+          <a:xfrm>
+            <a:off x="8759153" y="2435860"/>
+            <a:ext cx="2932018" cy="731520"/>
+          </a:xfrm>
+          <a:prstGeom prst="rect">
+            <a:avLst/>
+          </a:prstGeom>
+        </p:spPr>
+        <p:style>
+          <a:lnRef idx="2">
+            <a:schemeClr val="accent1">
+              <a:shade val="50000"/>
+            </a:schemeClr>
+          </a:lnRef>
+          <a:fillRef idx="1">
+            <a:schemeClr val="accent1"/>
+          </a:fillRef>
+          <a:effectRef idx="0">
+            <a:schemeClr val="accent1"/>
+          </a:effectRef>
+          <a:fontRef idx="minor">
+            <a:schemeClr val="lt1"/>
+          </a:fontRef>
+        </p:style>
+        <p:txBody>
+          <a:bodyPr rtlCol="0" anchor="ctr"/>
+          <a:lstStyle/>
+          <a:p>
+            <a:pPr algn="ctr"/>
+            <a:r>
+              <a:rPr lang="en-US" dirty="0" err="1"/>
+              <a:t>input.c</a:t>
+            </a:r>
+            <a:endParaRPr lang="en-US" dirty="0" smtClean="0"/>
+          </a:p>
+        </p:txBody>
+      </p:sp>
+      <p:sp>
+        <p:nvSpPr>
+          <p:cNvPr id="51" name="Rectangle 50"/>
+          <p:cNvSpPr/>
+          <p:nvPr/>
+        </p:nvSpPr>
+        <p:spPr>
+          <a:xfrm>
+            <a:off x="8060885" y="446663"/>
+            <a:ext cx="2932018" cy="731520"/>
+          </a:xfrm>
+          <a:prstGeom prst="rect">
+            <a:avLst/>
+          </a:prstGeom>
+        </p:spPr>
+        <p:style>
+          <a:lnRef idx="2">
+            <a:schemeClr val="accent1">
+              <a:shade val="50000"/>
+            </a:schemeClr>
+          </a:lnRef>
+          <a:fillRef idx="1">
+            <a:schemeClr val="accent1"/>
+          </a:fillRef>
+          <a:effectRef idx="0">
+            <a:schemeClr val="accent1"/>
+          </a:effectRef>
+          <a:fontRef idx="minor">
+            <a:schemeClr val="lt1"/>
+          </a:fontRef>
+        </p:style>
+        <p:txBody>
+          <a:bodyPr rtlCol="0" anchor="ctr"/>
+          <a:lstStyle/>
+          <a:p>
+            <a:pPr algn="ctr"/>
+            <a:r>
+              <a:rPr lang="en-US" dirty="0" err="1"/>
+              <a:t>screen_logo.c</a:t>
+            </a:r>
+            <a:endParaRPr lang="en-US" dirty="0" smtClean="0"/>
+          </a:p>
+        </p:txBody>
+      </p:sp>
+      <p:sp>
+        <p:nvSpPr>
+          <p:cNvPr id="52" name="Rectangle 51"/>
+          <p:cNvSpPr/>
+          <p:nvPr/>
+        </p:nvSpPr>
+        <p:spPr>
+          <a:xfrm>
+            <a:off x="8110761" y="5204495"/>
+            <a:ext cx="2932018" cy="731520"/>
+          </a:xfrm>
+          <a:prstGeom prst="rect">
+            <a:avLst/>
+          </a:prstGeom>
+        </p:spPr>
+        <p:style>
+          <a:lnRef idx="2">
+            <a:schemeClr val="accent1">
+              <a:shade val="50000"/>
+            </a:schemeClr>
+          </a:lnRef>
+          <a:fillRef idx="1">
+            <a:schemeClr val="accent1"/>
+          </a:fillRef>
+          <a:effectRef idx="0">
+            <a:schemeClr val="accent1"/>
+          </a:effectRef>
+          <a:fontRef idx="minor">
+            <a:schemeClr val="lt1"/>
+          </a:fontRef>
+        </p:style>
+        <p:txBody>
+          <a:bodyPr rtlCol="0" anchor="ctr"/>
+          <a:lstStyle/>
+          <a:p>
+            <a:pPr algn="ctr"/>
+            <a:r>
+              <a:rPr lang="en-US" dirty="0" err="1"/>
+              <a:t>skybox.c</a:t>
+            </a:r>
+            <a:endParaRPr lang="en-US" dirty="0" smtClean="0"/>
+          </a:p>
+        </p:txBody>
+      </p:sp>
+      <p:sp>
+        <p:nvSpPr>
+          <p:cNvPr id="53" name="Rectangle 52"/>
+          <p:cNvSpPr/>
+          <p:nvPr/>
+        </p:nvSpPr>
+        <p:spPr>
+          <a:xfrm>
+            <a:off x="8759153" y="1625118"/>
+            <a:ext cx="2932018" cy="731520"/>
+          </a:xfrm>
+          <a:prstGeom prst="rect">
+            <a:avLst/>
+          </a:prstGeom>
+        </p:spPr>
+        <p:style>
+          <a:lnRef idx="2">
+            <a:schemeClr val="accent1">
+              <a:shade val="50000"/>
+            </a:schemeClr>
+          </a:lnRef>
+          <a:fillRef idx="1">
+            <a:schemeClr val="accent1"/>
+          </a:fillRef>
+          <a:effectRef idx="0">
+            <a:schemeClr val="accent1"/>
+          </a:effectRef>
+          <a:fontRef idx="minor">
+            <a:schemeClr val="lt1"/>
+          </a:fontRef>
+        </p:style>
+        <p:txBody>
+          <a:bodyPr rtlCol="0" anchor="ctr"/>
+          <a:lstStyle/>
+          <a:p>
+            <a:pPr algn="ctr"/>
+            <a:r>
+              <a:rPr lang="en-US" dirty="0" err="1"/>
+              <a:t>tick.c</a:t>
+            </a:r>
+            <a:endParaRPr lang="en-US" dirty="0" smtClean="0"/>
+          </a:p>
+        </p:txBody>
+      </p:sp>
+      <p:sp>
+        <p:nvSpPr>
+          <p:cNvPr id="54" name="Rectangle 53"/>
+          <p:cNvSpPr/>
+          <p:nvPr/>
+        </p:nvSpPr>
+        <p:spPr>
+          <a:xfrm>
+            <a:off x="173115" y="185417"/>
+            <a:ext cx="5820358" cy="1385688"/>
+          </a:xfrm>
+          <a:prstGeom prst="rect">
+            <a:avLst/>
+          </a:prstGeom>
+          <a:noFill/>
+          <a:ln>
+            <a:solidFill>
+              <a:schemeClr val="bg1">
+                <a:lumMod val="75000"/>
+              </a:schemeClr>
+            </a:solidFill>
+            <a:prstDash val="dash"/>
+          </a:ln>
+        </p:spPr>
+        <p:style>
+          <a:lnRef idx="2">
+            <a:schemeClr val="accent1">
+              <a:shade val="50000"/>
+            </a:schemeClr>
+          </a:lnRef>
+          <a:fillRef idx="1">
+            <a:schemeClr val="accent1"/>
+          </a:fillRef>
+          <a:effectRef idx="0">
+            <a:schemeClr val="accent1"/>
+          </a:effectRef>
+          <a:fontRef idx="minor">
+            <a:schemeClr val="lt1"/>
+          </a:fontRef>
+        </p:style>
+        <p:txBody>
+          <a:bodyPr rtlCol="0" anchor="t"/>
+          <a:lstStyle/>
+          <a:p>
+            <a:r>
+              <a:rPr lang="en-US" dirty="0" smtClean="0">
+                <a:solidFill>
+                  <a:schemeClr val="bg1">
+                    <a:lumMod val="65000"/>
+                  </a:schemeClr>
+                </a:solidFill>
+              </a:rPr>
+              <a:t>/standalone/desktop_win64</a:t>
+            </a:r>
+            <a:endParaRPr lang="en-US" dirty="0">
+              <a:solidFill>
+                <a:schemeClr val="bg1">
+                  <a:lumMod val="65000"/>
+                </a:schemeClr>
+              </a:solidFill>
+            </a:endParaRPr>
+          </a:p>
+        </p:txBody>
+      </p:sp>
+      <p:sp>
+        <p:nvSpPr>
+          <p:cNvPr id="55" name="Rectangle 54"/>
+          <p:cNvSpPr/>
+          <p:nvPr/>
+        </p:nvSpPr>
+        <p:spPr>
+          <a:xfrm>
+            <a:off x="173114" y="1569023"/>
+            <a:ext cx="5820361" cy="4505722"/>
+          </a:xfrm>
+          <a:prstGeom prst="rect">
+            <a:avLst/>
+          </a:prstGeom>
+          <a:noFill/>
+          <a:ln>
+            <a:solidFill>
+              <a:schemeClr val="bg1">
+                <a:lumMod val="75000"/>
+              </a:schemeClr>
+            </a:solidFill>
+            <a:prstDash val="dash"/>
+          </a:ln>
+        </p:spPr>
+        <p:style>
+          <a:lnRef idx="2">
+            <a:schemeClr val="accent1">
+              <a:shade val="50000"/>
+            </a:schemeClr>
+          </a:lnRef>
+          <a:fillRef idx="1">
+            <a:schemeClr val="accent1"/>
+          </a:fillRef>
+          <a:effectRef idx="0">
+            <a:schemeClr val="accent1"/>
+          </a:effectRef>
+          <a:fontRef idx="minor">
+            <a:schemeClr val="lt1"/>
+          </a:fontRef>
+        </p:style>
+        <p:txBody>
+          <a:bodyPr rtlCol="0" anchor="t"/>
+          <a:lstStyle/>
+          <a:p>
+            <a:r>
+              <a:rPr lang="en-US" dirty="0" smtClean="0">
+                <a:solidFill>
+                  <a:schemeClr val="bg1">
+                    <a:lumMod val="65000"/>
+                  </a:schemeClr>
+                </a:solidFill>
+              </a:rPr>
+              <a:t>/platform/game</a:t>
+            </a:r>
+            <a:endParaRPr lang="en-US" dirty="0">
+              <a:solidFill>
+                <a:schemeClr val="bg1">
+                  <a:lumMod val="65000"/>
+                </a:schemeClr>
+              </a:solidFill>
+            </a:endParaRPr>
+          </a:p>
+        </p:txBody>
+      </p:sp>
+      <p:sp>
+        <p:nvSpPr>
+          <p:cNvPr id="56" name="Rectangle 55"/>
+          <p:cNvSpPr/>
+          <p:nvPr/>
+        </p:nvSpPr>
+        <p:spPr>
+          <a:xfrm>
+            <a:off x="5993476" y="185417"/>
+            <a:ext cx="5893724" cy="5889328"/>
+          </a:xfrm>
+          <a:prstGeom prst="rect">
+            <a:avLst/>
+          </a:prstGeom>
+          <a:noFill/>
+          <a:ln>
+            <a:solidFill>
+              <a:schemeClr val="bg1">
+                <a:lumMod val="75000"/>
+              </a:schemeClr>
+            </a:solidFill>
+            <a:prstDash val="dash"/>
+          </a:ln>
+        </p:spPr>
+        <p:style>
+          <a:lnRef idx="2">
+            <a:schemeClr val="accent1">
+              <a:shade val="50000"/>
+            </a:schemeClr>
+          </a:lnRef>
+          <a:fillRef idx="1">
+            <a:schemeClr val="accent1"/>
+          </a:fillRef>
+          <a:effectRef idx="0">
+            <a:schemeClr val="accent1"/>
+          </a:effectRef>
+          <a:fontRef idx="minor">
+            <a:schemeClr val="lt1"/>
+          </a:fontRef>
+        </p:style>
+        <p:txBody>
+          <a:bodyPr rtlCol="0" anchor="t"/>
+          <a:lstStyle/>
+          <a:p>
+            <a:r>
+              <a:rPr lang="en-US" dirty="0" smtClean="0">
+                <a:solidFill>
+                  <a:schemeClr val="bg1">
+                    <a:lumMod val="65000"/>
+                  </a:schemeClr>
+                </a:solidFill>
+              </a:rPr>
+              <a:t>/platform/engine</a:t>
+            </a:r>
+            <a:endParaRPr lang="en-US" dirty="0">
+              <a:solidFill>
+                <a:schemeClr val="bg1">
+                  <a:lumMod val="65000"/>
+                </a:schemeClr>
+              </a:solidFill>
+            </a:endParaRPr>
+          </a:p>
+        </p:txBody>
+      </p:sp>
+      <p:cxnSp>
+        <p:nvCxnSpPr>
+          <p:cNvPr id="57" name="Straight Connector 56"/>
+          <p:cNvCxnSpPr>
+            <a:stCxn id="46" idx="0"/>
+            <a:endCxn id="31" idx="2"/>
+          </p:cNvCxnSpPr>
+          <p:nvPr/>
+        </p:nvCxnSpPr>
+        <p:spPr>
+          <a:xfrm flipV="1">
+            <a:off x="2003588" y="1361490"/>
+            <a:ext cx="0" cy="691562"/>
+          </a:xfrm>
+          <a:prstGeom prst="line">
+            <a:avLst/>
+          </a:prstGeom>
+          <a:ln>
+            <a:headEnd type="triangle" w="med" len="med"/>
+            <a:tailEnd type="none" w="med" len="med"/>
+          </a:ln>
+        </p:spPr>
+        <p:style>
+          <a:lnRef idx="2">
+            <a:schemeClr val="accent3"/>
+          </a:lnRef>
+          <a:fillRef idx="0">
+            <a:schemeClr val="accent3"/>
+          </a:fillRef>
+          <a:effectRef idx="1">
+            <a:schemeClr val="accent3"/>
+          </a:effectRef>
+          <a:fontRef idx="minor">
+            <a:schemeClr val="tx1"/>
+          </a:fontRef>
+        </p:style>
+      </p:cxnSp>
+      <p:cxnSp>
+        <p:nvCxnSpPr>
+          <p:cNvPr id="60" name="Straight Connector 59"/>
+          <p:cNvCxnSpPr>
+            <a:stCxn id="51" idx="1"/>
+            <a:endCxn id="46" idx="3"/>
+          </p:cNvCxnSpPr>
+          <p:nvPr/>
+        </p:nvCxnSpPr>
+        <p:spPr>
+          <a:xfrm flipH="1">
+            <a:off x="3469597" y="812423"/>
+            <a:ext cx="4591288" cy="1606389"/>
+          </a:xfrm>
+          <a:prstGeom prst="line">
+            <a:avLst/>
+          </a:prstGeom>
+          <a:ln>
+            <a:headEnd type="triangle" w="med" len="med"/>
+            <a:tailEnd type="none" w="med" len="med"/>
+          </a:ln>
+        </p:spPr>
+        <p:style>
+          <a:lnRef idx="2">
+            <a:schemeClr val="accent3"/>
+          </a:lnRef>
+          <a:fillRef idx="0">
+            <a:schemeClr val="accent3"/>
+          </a:fillRef>
+          <a:effectRef idx="1">
+            <a:schemeClr val="accent3"/>
+          </a:effectRef>
+          <a:fontRef idx="minor">
+            <a:schemeClr val="tx1"/>
+          </a:fontRef>
+        </p:style>
+      </p:cxnSp>
+      <p:cxnSp>
+        <p:nvCxnSpPr>
+          <p:cNvPr id="61" name="Straight Connector 60"/>
+          <p:cNvCxnSpPr>
+            <a:stCxn id="44" idx="0"/>
+            <a:endCxn id="46" idx="2"/>
+          </p:cNvCxnSpPr>
+          <p:nvPr/>
+        </p:nvCxnSpPr>
+        <p:spPr>
+          <a:xfrm flipV="1">
+            <a:off x="1992824" y="2784572"/>
+            <a:ext cx="10764" cy="1205570"/>
+          </a:xfrm>
+          <a:prstGeom prst="line">
+            <a:avLst/>
+          </a:prstGeom>
+          <a:ln>
+            <a:headEnd type="triangle" w="med" len="med"/>
+            <a:tailEnd type="none" w="med" len="med"/>
+          </a:ln>
+        </p:spPr>
+        <p:style>
+          <a:lnRef idx="2">
+            <a:schemeClr val="accent3"/>
+          </a:lnRef>
+          <a:fillRef idx="0">
+            <a:schemeClr val="accent3"/>
+          </a:fillRef>
+          <a:effectRef idx="1">
+            <a:schemeClr val="accent3"/>
+          </a:effectRef>
+          <a:fontRef idx="minor">
+            <a:schemeClr val="tx1"/>
+          </a:fontRef>
+        </p:style>
+      </p:cxnSp>
+      <p:cxnSp>
+        <p:nvCxnSpPr>
+          <p:cNvPr id="62" name="Straight Connector 61"/>
+          <p:cNvCxnSpPr>
+            <a:stCxn id="53" idx="1"/>
+            <a:endCxn id="44" idx="3"/>
+          </p:cNvCxnSpPr>
+          <p:nvPr/>
+        </p:nvCxnSpPr>
+        <p:spPr>
+          <a:xfrm flipH="1">
+            <a:off x="3458833" y="1990878"/>
+            <a:ext cx="5300320" cy="2365024"/>
+          </a:xfrm>
+          <a:prstGeom prst="line">
+            <a:avLst/>
+          </a:prstGeom>
+          <a:ln>
+            <a:headEnd type="triangle" w="med" len="med"/>
+            <a:tailEnd type="none" w="med" len="med"/>
+          </a:ln>
+        </p:spPr>
+        <p:style>
+          <a:lnRef idx="2">
+            <a:schemeClr val="accent3"/>
+          </a:lnRef>
+          <a:fillRef idx="0">
+            <a:schemeClr val="accent3"/>
+          </a:fillRef>
+          <a:effectRef idx="1">
+            <a:schemeClr val="accent3"/>
+          </a:effectRef>
+          <a:fontRef idx="minor">
+            <a:schemeClr val="tx1"/>
+          </a:fontRef>
+        </p:style>
+      </p:cxnSp>
+      <p:cxnSp>
+        <p:nvCxnSpPr>
+          <p:cNvPr id="63" name="Straight Connector 62"/>
+          <p:cNvCxnSpPr>
+            <a:stCxn id="47" idx="1"/>
+            <a:endCxn id="43" idx="3"/>
+          </p:cNvCxnSpPr>
+          <p:nvPr/>
+        </p:nvCxnSpPr>
+        <p:spPr>
+          <a:xfrm flipH="1">
+            <a:off x="3458833" y="4736429"/>
+            <a:ext cx="4651928" cy="600596"/>
+          </a:xfrm>
+          <a:prstGeom prst="line">
+            <a:avLst/>
+          </a:prstGeom>
+          <a:ln>
+            <a:headEnd type="triangle" w="med" len="med"/>
+            <a:tailEnd type="none" w="med" len="med"/>
+          </a:ln>
+        </p:spPr>
+        <p:style>
+          <a:lnRef idx="2">
+            <a:schemeClr val="accent3"/>
+          </a:lnRef>
+          <a:fillRef idx="0">
+            <a:schemeClr val="accent3"/>
+          </a:fillRef>
+          <a:effectRef idx="1">
+            <a:schemeClr val="accent3"/>
+          </a:effectRef>
+          <a:fontRef idx="minor">
+            <a:schemeClr val="tx1"/>
+          </a:fontRef>
+        </p:style>
+      </p:cxnSp>
+      <p:cxnSp>
+        <p:nvCxnSpPr>
+          <p:cNvPr id="64" name="Straight Connector 63"/>
+          <p:cNvCxnSpPr>
+            <a:stCxn id="52" idx="1"/>
+            <a:endCxn id="43" idx="3"/>
+          </p:cNvCxnSpPr>
+          <p:nvPr/>
+        </p:nvCxnSpPr>
+        <p:spPr>
+          <a:xfrm flipH="1" flipV="1">
+            <a:off x="3458833" y="5337025"/>
+            <a:ext cx="4651928" cy="233230"/>
+          </a:xfrm>
+          <a:prstGeom prst="line">
+            <a:avLst/>
+          </a:prstGeom>
+          <a:ln>
+            <a:headEnd type="triangle" w="med" len="med"/>
+            <a:tailEnd type="none" w="med" len="med"/>
+          </a:ln>
+        </p:spPr>
+        <p:style>
+          <a:lnRef idx="2">
+            <a:schemeClr val="accent3"/>
+          </a:lnRef>
+          <a:fillRef idx="0">
+            <a:schemeClr val="accent3"/>
+          </a:fillRef>
+          <a:effectRef idx="1">
+            <a:schemeClr val="accent3"/>
+          </a:effectRef>
+          <a:fontRef idx="minor">
+            <a:schemeClr val="tx1"/>
+          </a:fontRef>
+        </p:style>
+      </p:cxnSp>
+      <p:cxnSp>
+        <p:nvCxnSpPr>
+          <p:cNvPr id="68" name="Straight Connector 67"/>
+          <p:cNvCxnSpPr>
+            <a:stCxn id="49" idx="1"/>
+            <a:endCxn id="44" idx="3"/>
+          </p:cNvCxnSpPr>
+          <p:nvPr/>
+        </p:nvCxnSpPr>
+        <p:spPr>
+          <a:xfrm flipH="1">
+            <a:off x="3458833" y="3639253"/>
+            <a:ext cx="5300320" cy="716649"/>
+          </a:xfrm>
+          <a:prstGeom prst="line">
+            <a:avLst/>
+          </a:prstGeom>
+          <a:ln>
+            <a:headEnd type="triangle" w="med" len="med"/>
+            <a:tailEnd type="none" w="med" len="med"/>
+          </a:ln>
+        </p:spPr>
+        <p:style>
+          <a:lnRef idx="2">
+            <a:schemeClr val="accent3"/>
+          </a:lnRef>
+          <a:fillRef idx="0">
+            <a:schemeClr val="accent3"/>
+          </a:fillRef>
+          <a:effectRef idx="1">
+            <a:schemeClr val="accent3"/>
+          </a:effectRef>
+          <a:fontRef idx="minor">
+            <a:schemeClr val="tx1"/>
+          </a:fontRef>
+        </p:style>
+      </p:cxnSp>
+      <p:cxnSp>
+        <p:nvCxnSpPr>
+          <p:cNvPr id="71" name="Straight Connector 70"/>
+          <p:cNvCxnSpPr>
+            <a:stCxn id="50" idx="1"/>
+            <a:endCxn id="44" idx="3"/>
+          </p:cNvCxnSpPr>
+          <p:nvPr/>
+        </p:nvCxnSpPr>
+        <p:spPr>
+          <a:xfrm flipH="1">
+            <a:off x="3458833" y="2801620"/>
+            <a:ext cx="5300320" cy="1554282"/>
+          </a:xfrm>
+          <a:prstGeom prst="line">
+            <a:avLst/>
+          </a:prstGeom>
+          <a:ln>
+            <a:headEnd type="triangle" w="med" len="med"/>
+            <a:tailEnd type="none" w="med" len="med"/>
+          </a:ln>
+        </p:spPr>
+        <p:style>
+          <a:lnRef idx="2">
+            <a:schemeClr val="accent3"/>
+          </a:lnRef>
+          <a:fillRef idx="0">
+            <a:schemeClr val="accent3"/>
+          </a:fillRef>
+          <a:effectRef idx="1">
+            <a:schemeClr val="accent3"/>
+          </a:effectRef>
+          <a:fontRef idx="minor">
+            <a:schemeClr val="tx1"/>
+          </a:fontRef>
+        </p:style>
+      </p:cxnSp>
+      <p:sp>
+        <p:nvSpPr>
+          <p:cNvPr id="75" name="Rectangle 74"/>
+          <p:cNvSpPr/>
+          <p:nvPr/>
+        </p:nvSpPr>
+        <p:spPr>
+          <a:xfrm>
+            <a:off x="425618" y="6203003"/>
+            <a:ext cx="182880" cy="182880"/>
+          </a:xfrm>
+          <a:prstGeom prst="rect">
+            <a:avLst/>
+          </a:prstGeom>
+        </p:spPr>
+        <p:style>
+          <a:lnRef idx="2">
+            <a:schemeClr val="accent1">
+              <a:shade val="50000"/>
+            </a:schemeClr>
+          </a:lnRef>
+          <a:fillRef idx="1">
+            <a:schemeClr val="accent1"/>
+          </a:fillRef>
+          <a:effectRef idx="0">
+            <a:schemeClr val="accent1"/>
+          </a:effectRef>
+          <a:fontRef idx="minor">
+            <a:schemeClr val="lt1"/>
+          </a:fontRef>
+        </p:style>
+        <p:txBody>
+          <a:bodyPr rtlCol="0" anchor="ctr"/>
+          <a:lstStyle/>
+          <a:p>
+            <a:pPr algn="ctr"/>
+            <a:endParaRPr lang="en-US" dirty="0"/>
+          </a:p>
+        </p:txBody>
+      </p:sp>
+      <p:sp>
+        <p:nvSpPr>
+          <p:cNvPr id="76" name="Rectangle 75"/>
+          <p:cNvSpPr/>
+          <p:nvPr/>
+        </p:nvSpPr>
+        <p:spPr>
+          <a:xfrm>
+            <a:off x="420627" y="6462633"/>
+            <a:ext cx="182880" cy="182880"/>
+          </a:xfrm>
+          <a:prstGeom prst="rect">
+            <a:avLst/>
+          </a:prstGeom>
+        </p:spPr>
+        <p:style>
+          <a:lnRef idx="2">
+            <a:schemeClr val="accent3">
+              <a:shade val="50000"/>
+            </a:schemeClr>
+          </a:lnRef>
+          <a:fillRef idx="1">
+            <a:schemeClr val="accent3"/>
+          </a:fillRef>
+          <a:effectRef idx="0">
+            <a:schemeClr val="accent3"/>
+          </a:effectRef>
+          <a:fontRef idx="minor">
+            <a:schemeClr val="lt1"/>
+          </a:fontRef>
+        </p:style>
+        <p:txBody>
+          <a:bodyPr rtlCol="0" anchor="ctr"/>
+          <a:lstStyle/>
+          <a:p>
+            <a:pPr algn="ctr"/>
+            <a:endParaRPr lang="en-US" dirty="0"/>
+          </a:p>
+        </p:txBody>
+      </p:sp>
+      <p:sp>
+        <p:nvSpPr>
+          <p:cNvPr id="77" name="TextBox 76"/>
+          <p:cNvSpPr txBox="1"/>
+          <p:nvPr/>
+        </p:nvSpPr>
+        <p:spPr>
+          <a:xfrm>
+            <a:off x="581888" y="6074745"/>
+            <a:ext cx="4310982" cy="646331"/>
+          </a:xfrm>
+          <a:prstGeom prst="rect">
+            <a:avLst/>
+          </a:prstGeom>
+          <a:noFill/>
+        </p:spPr>
+        <p:txBody>
+          <a:bodyPr wrap="square" rtlCol="0">
+            <a:spAutoFit/>
+          </a:bodyPr>
+          <a:lstStyle/>
+          <a:p>
+            <a:pPr>
+              <a:lnSpc>
+                <a:spcPct val="150000"/>
+              </a:lnSpc>
+            </a:pPr>
+            <a:r>
+              <a:rPr lang="en-US" sz="1200" dirty="0" smtClean="0"/>
+              <a:t>: source</a:t>
+            </a:r>
+          </a:p>
+          <a:p>
+            <a:pPr>
+              <a:lnSpc>
+                <a:spcPct val="150000"/>
+              </a:lnSpc>
+            </a:pPr>
+            <a:r>
+              <a:rPr lang="en-US" sz="1200" dirty="0" smtClean="0"/>
+              <a:t>: binary	           : runtime</a:t>
+            </a:r>
+            <a:endParaRPr lang="en-US" sz="1200" dirty="0"/>
+          </a:p>
+        </p:txBody>
+      </p:sp>
+      <p:sp>
+        <p:nvSpPr>
+          <p:cNvPr id="78" name="Rectangle 77"/>
+          <p:cNvSpPr/>
+          <p:nvPr/>
+        </p:nvSpPr>
+        <p:spPr>
+          <a:xfrm>
+            <a:off x="1695798" y="6458713"/>
+            <a:ext cx="182880" cy="182880"/>
+          </a:xfrm>
+          <a:prstGeom prst="rect">
+            <a:avLst/>
+          </a:prstGeom>
+        </p:spPr>
+        <p:style>
+          <a:lnRef idx="2">
+            <a:schemeClr val="accent2">
+              <a:shade val="50000"/>
+            </a:schemeClr>
+          </a:lnRef>
+          <a:fillRef idx="1">
+            <a:schemeClr val="accent2"/>
+          </a:fillRef>
+          <a:effectRef idx="0">
+            <a:schemeClr val="accent2"/>
+          </a:effectRef>
+          <a:fontRef idx="minor">
+            <a:schemeClr val="lt1"/>
+          </a:fontRef>
+        </p:style>
+        <p:txBody>
+          <a:bodyPr rtlCol="0" anchor="ctr"/>
+          <a:lstStyle/>
+          <a:p>
+            <a:pPr algn="ctr"/>
+            <a:endParaRPr lang="en-US" dirty="0"/>
+          </a:p>
+        </p:txBody>
+      </p:sp>
+      <p:sp>
+        <p:nvSpPr>
+          <p:cNvPr id="79" name="TextBox 78"/>
+          <p:cNvSpPr txBox="1"/>
+          <p:nvPr/>
+        </p:nvSpPr>
+        <p:spPr>
+          <a:xfrm>
+            <a:off x="3358347" y="6160653"/>
+            <a:ext cx="5286893" cy="369332"/>
+          </a:xfrm>
+          <a:prstGeom prst="rect">
+            <a:avLst/>
+          </a:prstGeom>
+          <a:noFill/>
+        </p:spPr>
+        <p:txBody>
+          <a:bodyPr wrap="square" rtlCol="0">
+            <a:spAutoFit/>
+          </a:bodyPr>
+          <a:lstStyle/>
+          <a:p>
+            <a:pPr algn="ctr"/>
+            <a:r>
+              <a:rPr lang="en-US" b="1" dirty="0" smtClean="0"/>
+              <a:t>Components Diagram</a:t>
+            </a:r>
+            <a:endParaRPr lang="en-US" b="1" dirty="0"/>
+          </a:p>
+        </p:txBody>
+      </p:sp>
+      <p:cxnSp>
+        <p:nvCxnSpPr>
+          <p:cNvPr id="80" name="Straight Connector 79"/>
+          <p:cNvCxnSpPr>
+            <a:stCxn id="43" idx="0"/>
+            <a:endCxn id="44" idx="2"/>
+          </p:cNvCxnSpPr>
+          <p:nvPr/>
+        </p:nvCxnSpPr>
+        <p:spPr>
+          <a:xfrm flipH="1" flipV="1">
+            <a:off x="1992824" y="4721662"/>
+            <a:ext cx="2712" cy="249603"/>
+          </a:xfrm>
+          <a:prstGeom prst="line">
+            <a:avLst/>
+          </a:prstGeom>
+          <a:ln>
+            <a:headEnd type="triangle" w="med" len="med"/>
+            <a:tailEnd type="none" w="med" len="med"/>
+          </a:ln>
+        </p:spPr>
+        <p:style>
+          <a:lnRef idx="2">
+            <a:schemeClr val="accent3"/>
+          </a:lnRef>
+          <a:fillRef idx="0">
+            <a:schemeClr val="accent3"/>
+          </a:fillRef>
+          <a:effectRef idx="1">
+            <a:schemeClr val="accent3"/>
+          </a:effectRef>
+          <a:fontRef idx="minor">
+            <a:schemeClr val="tx1"/>
+          </a:fontRef>
+        </p:style>
+      </p:cxnSp>
+    </p:spTree>
+    <p:extLst>
+      <p:ext uri="{BB962C8B-B14F-4D97-AF65-F5344CB8AC3E}">
+        <p14:creationId xmlns:p14="http://schemas.microsoft.com/office/powerpoint/2010/main" val="511600952"/>
+      </p:ext>
+    </p:extLst>
+  </p:cSld>
+  <p:clrMapOvr>
+    <a:masterClrMapping/>
+  </p:clrMapOvr>
+  <p:timing>
+    <p:tnLst>
+      <p:par>
+        <p:cTn id="1" dur="indefinite" restart="never" nodeType="tmRoot"/>
+      </p:par>
+    </p:tnLst>
+  </p:timing>
+</p:sld>
+</file>
+
 <file path=ppt/theme/theme1.xml><?xml version="1.0" encoding="utf-8"?>
 <a:theme xmlns:a="http://schemas.openxmlformats.org/drawingml/2006/main" name="Office Theme">
   <a:themeElements>

</xml_diff>

<commit_message>
docs: ✏️ objects diagram
</commit_message>
<xml_diff>
--- a/docs/README/diagrams.pptx
+++ b/docs/README/diagrams.pptx
@@ -5540,7 +5540,15 @@
             <a:pPr algn="ctr"/>
             <a:r>
               <a:rPr lang="en-US" b="1" dirty="0" smtClean="0"/>
-              <a:t>Components Diagram</a:t>
+              <a:t>Objects</a:t>
+            </a:r>
+            <a:r>
+              <a:rPr lang="en-US" b="1" dirty="0" smtClean="0"/>
+              <a:t> </a:t>
+            </a:r>
+            <a:r>
+              <a:rPr lang="en-US" b="1" dirty="0" smtClean="0"/>
+              <a:t>Diagram</a:t>
             </a:r>
             <a:endParaRPr lang="en-US" b="1" dirty="0"/>
           </a:p>

</xml_diff>

<commit_message>
docs: ✏️ readme - diagram
</commit_message>
<xml_diff>
--- a/docs/README/diagrams.pptx
+++ b/docs/README/diagrams.pptx
@@ -107,7 +107,7 @@
   </p:defaultTextStyle>
   <p:extLst>
     <p:ext uri="{EFAFB233-063F-42B5-8137-9DF3F51BA10A}">
-      <p15:sldGuideLst xmlns:p15="http://schemas.microsoft.com/office/powerpoint/2012/main"/>
+      <p15:sldGuideLst xmlns:p15="http://schemas.microsoft.com/office/powerpoint/2012/main" xmlns=""/>
     </p:ext>
   </p:extLst>
 </p:presentation>
@@ -244,7 +244,8 @@
           <a:p>
             <a:fld id="{388BEFF6-CA1E-4F2C-AB17-C8AC986E5615}" type="datetimeFigureOut">
               <a:rPr lang="en-US" smtClean="0"/>
-              <a:t>4/2/2024</a:t>
+              <a:pPr/>
+              <a:t>4/7/2024</a:t>
             </a:fld>
             <a:endParaRPr lang="en-US"/>
           </a:p>
@@ -286,7 +287,8 @@
           <a:p>
             <a:fld id="{B2B78684-98AC-4705-8032-58D98476EAE5}" type="slidenum">
               <a:rPr lang="en-US" smtClean="0"/>
-              <a:t>‹#›</a:t>
+              <a:pPr/>
+              <a:t>‹N°›</a:t>
             </a:fld>
             <a:endParaRPr lang="en-US"/>
           </a:p>
@@ -295,7 +297,7 @@
     </p:spTree>
     <p:extLst>
       <p:ext uri="{BB962C8B-B14F-4D97-AF65-F5344CB8AC3E}">
-        <p14:creationId xmlns:p14="http://schemas.microsoft.com/office/powerpoint/2010/main" val="2436347131"/>
+        <p14:creationId xmlns:p14="http://schemas.microsoft.com/office/powerpoint/2010/main" xmlns="" val="2436347131"/>
       </p:ext>
     </p:extLst>
   </p:cSld>
@@ -414,7 +416,8 @@
           <a:p>
             <a:fld id="{388BEFF6-CA1E-4F2C-AB17-C8AC986E5615}" type="datetimeFigureOut">
               <a:rPr lang="en-US" smtClean="0"/>
-              <a:t>4/2/2024</a:t>
+              <a:pPr/>
+              <a:t>4/7/2024</a:t>
             </a:fld>
             <a:endParaRPr lang="en-US"/>
           </a:p>
@@ -456,7 +459,8 @@
           <a:p>
             <a:fld id="{B2B78684-98AC-4705-8032-58D98476EAE5}" type="slidenum">
               <a:rPr lang="en-US" smtClean="0"/>
-              <a:t>‹#›</a:t>
+              <a:pPr/>
+              <a:t>‹N°›</a:t>
             </a:fld>
             <a:endParaRPr lang="en-US"/>
           </a:p>
@@ -465,7 +469,7 @@
     </p:spTree>
     <p:extLst>
       <p:ext uri="{BB962C8B-B14F-4D97-AF65-F5344CB8AC3E}">
-        <p14:creationId xmlns:p14="http://schemas.microsoft.com/office/powerpoint/2010/main" val="488834116"/>
+        <p14:creationId xmlns:p14="http://schemas.microsoft.com/office/powerpoint/2010/main" xmlns="" val="488834116"/>
       </p:ext>
     </p:extLst>
   </p:cSld>
@@ -594,7 +598,8 @@
           <a:p>
             <a:fld id="{388BEFF6-CA1E-4F2C-AB17-C8AC986E5615}" type="datetimeFigureOut">
               <a:rPr lang="en-US" smtClean="0"/>
-              <a:t>4/2/2024</a:t>
+              <a:pPr/>
+              <a:t>4/7/2024</a:t>
             </a:fld>
             <a:endParaRPr lang="en-US"/>
           </a:p>
@@ -636,7 +641,8 @@
           <a:p>
             <a:fld id="{B2B78684-98AC-4705-8032-58D98476EAE5}" type="slidenum">
               <a:rPr lang="en-US" smtClean="0"/>
-              <a:t>‹#›</a:t>
+              <a:pPr/>
+              <a:t>‹N°›</a:t>
             </a:fld>
             <a:endParaRPr lang="en-US"/>
           </a:p>
@@ -645,7 +651,7 @@
     </p:spTree>
     <p:extLst>
       <p:ext uri="{BB962C8B-B14F-4D97-AF65-F5344CB8AC3E}">
-        <p14:creationId xmlns:p14="http://schemas.microsoft.com/office/powerpoint/2010/main" val="3817113929"/>
+        <p14:creationId xmlns:p14="http://schemas.microsoft.com/office/powerpoint/2010/main" xmlns="" val="3817113929"/>
       </p:ext>
     </p:extLst>
   </p:cSld>
@@ -764,7 +770,8 @@
           <a:p>
             <a:fld id="{388BEFF6-CA1E-4F2C-AB17-C8AC986E5615}" type="datetimeFigureOut">
               <a:rPr lang="en-US" smtClean="0"/>
-              <a:t>4/2/2024</a:t>
+              <a:pPr/>
+              <a:t>4/7/2024</a:t>
             </a:fld>
             <a:endParaRPr lang="en-US"/>
           </a:p>
@@ -806,7 +813,8 @@
           <a:p>
             <a:fld id="{B2B78684-98AC-4705-8032-58D98476EAE5}" type="slidenum">
               <a:rPr lang="en-US" smtClean="0"/>
-              <a:t>‹#›</a:t>
+              <a:pPr/>
+              <a:t>‹N°›</a:t>
             </a:fld>
             <a:endParaRPr lang="en-US"/>
           </a:p>
@@ -815,7 +823,7 @@
     </p:spTree>
     <p:extLst>
       <p:ext uri="{BB962C8B-B14F-4D97-AF65-F5344CB8AC3E}">
-        <p14:creationId xmlns:p14="http://schemas.microsoft.com/office/powerpoint/2010/main" val="2511372462"/>
+        <p14:creationId xmlns:p14="http://schemas.microsoft.com/office/powerpoint/2010/main" xmlns="" val="2511372462"/>
       </p:ext>
     </p:extLst>
   </p:cSld>
@@ -1010,7 +1018,8 @@
           <a:p>
             <a:fld id="{388BEFF6-CA1E-4F2C-AB17-C8AC986E5615}" type="datetimeFigureOut">
               <a:rPr lang="en-US" smtClean="0"/>
-              <a:t>4/2/2024</a:t>
+              <a:pPr/>
+              <a:t>4/7/2024</a:t>
             </a:fld>
             <a:endParaRPr lang="en-US"/>
           </a:p>
@@ -1052,7 +1061,8 @@
           <a:p>
             <a:fld id="{B2B78684-98AC-4705-8032-58D98476EAE5}" type="slidenum">
               <a:rPr lang="en-US" smtClean="0"/>
-              <a:t>‹#›</a:t>
+              <a:pPr/>
+              <a:t>‹N°›</a:t>
             </a:fld>
             <a:endParaRPr lang="en-US"/>
           </a:p>
@@ -1061,7 +1071,7 @@
     </p:spTree>
     <p:extLst>
       <p:ext uri="{BB962C8B-B14F-4D97-AF65-F5344CB8AC3E}">
-        <p14:creationId xmlns:p14="http://schemas.microsoft.com/office/powerpoint/2010/main" val="890383841"/>
+        <p14:creationId xmlns:p14="http://schemas.microsoft.com/office/powerpoint/2010/main" xmlns="" val="890383841"/>
       </p:ext>
     </p:extLst>
   </p:cSld>
@@ -1242,7 +1252,8 @@
           <a:p>
             <a:fld id="{388BEFF6-CA1E-4F2C-AB17-C8AC986E5615}" type="datetimeFigureOut">
               <a:rPr lang="en-US" smtClean="0"/>
-              <a:t>4/2/2024</a:t>
+              <a:pPr/>
+              <a:t>4/7/2024</a:t>
             </a:fld>
             <a:endParaRPr lang="en-US"/>
           </a:p>
@@ -1284,7 +1295,8 @@
           <a:p>
             <a:fld id="{B2B78684-98AC-4705-8032-58D98476EAE5}" type="slidenum">
               <a:rPr lang="en-US" smtClean="0"/>
-              <a:t>‹#›</a:t>
+              <a:pPr/>
+              <a:t>‹N°›</a:t>
             </a:fld>
             <a:endParaRPr lang="en-US"/>
           </a:p>
@@ -1293,7 +1305,7 @@
     </p:spTree>
     <p:extLst>
       <p:ext uri="{BB962C8B-B14F-4D97-AF65-F5344CB8AC3E}">
-        <p14:creationId xmlns:p14="http://schemas.microsoft.com/office/powerpoint/2010/main" val="1347279164"/>
+        <p14:creationId xmlns:p14="http://schemas.microsoft.com/office/powerpoint/2010/main" xmlns="" val="1347279164"/>
       </p:ext>
     </p:extLst>
   </p:cSld>
@@ -1609,7 +1621,8 @@
           <a:p>
             <a:fld id="{388BEFF6-CA1E-4F2C-AB17-C8AC986E5615}" type="datetimeFigureOut">
               <a:rPr lang="en-US" smtClean="0"/>
-              <a:t>4/2/2024</a:t>
+              <a:pPr/>
+              <a:t>4/7/2024</a:t>
             </a:fld>
             <a:endParaRPr lang="en-US"/>
           </a:p>
@@ -1651,7 +1664,8 @@
           <a:p>
             <a:fld id="{B2B78684-98AC-4705-8032-58D98476EAE5}" type="slidenum">
               <a:rPr lang="en-US" smtClean="0"/>
-              <a:t>‹#›</a:t>
+              <a:pPr/>
+              <a:t>‹N°›</a:t>
             </a:fld>
             <a:endParaRPr lang="en-US"/>
           </a:p>
@@ -1660,7 +1674,7 @@
     </p:spTree>
     <p:extLst>
       <p:ext uri="{BB962C8B-B14F-4D97-AF65-F5344CB8AC3E}">
-        <p14:creationId xmlns:p14="http://schemas.microsoft.com/office/powerpoint/2010/main" val="2734694137"/>
+        <p14:creationId xmlns:p14="http://schemas.microsoft.com/office/powerpoint/2010/main" xmlns="" val="2734694137"/>
       </p:ext>
     </p:extLst>
   </p:cSld>
@@ -1727,7 +1741,8 @@
           <a:p>
             <a:fld id="{388BEFF6-CA1E-4F2C-AB17-C8AC986E5615}" type="datetimeFigureOut">
               <a:rPr lang="en-US" smtClean="0"/>
-              <a:t>4/2/2024</a:t>
+              <a:pPr/>
+              <a:t>4/7/2024</a:t>
             </a:fld>
             <a:endParaRPr lang="en-US"/>
           </a:p>
@@ -1769,7 +1784,8 @@
           <a:p>
             <a:fld id="{B2B78684-98AC-4705-8032-58D98476EAE5}" type="slidenum">
               <a:rPr lang="en-US" smtClean="0"/>
-              <a:t>‹#›</a:t>
+              <a:pPr/>
+              <a:t>‹N°›</a:t>
             </a:fld>
             <a:endParaRPr lang="en-US"/>
           </a:p>
@@ -1778,7 +1794,7 @@
     </p:spTree>
     <p:extLst>
       <p:ext uri="{BB962C8B-B14F-4D97-AF65-F5344CB8AC3E}">
-        <p14:creationId xmlns:p14="http://schemas.microsoft.com/office/powerpoint/2010/main" val="2753302791"/>
+        <p14:creationId xmlns:p14="http://schemas.microsoft.com/office/powerpoint/2010/main" xmlns="" val="2753302791"/>
       </p:ext>
     </p:extLst>
   </p:cSld>
@@ -1822,7 +1838,8 @@
           <a:p>
             <a:fld id="{388BEFF6-CA1E-4F2C-AB17-C8AC986E5615}" type="datetimeFigureOut">
               <a:rPr lang="en-US" smtClean="0"/>
-              <a:t>4/2/2024</a:t>
+              <a:pPr/>
+              <a:t>4/7/2024</a:t>
             </a:fld>
             <a:endParaRPr lang="en-US"/>
           </a:p>
@@ -1864,7 +1881,8 @@
           <a:p>
             <a:fld id="{B2B78684-98AC-4705-8032-58D98476EAE5}" type="slidenum">
               <a:rPr lang="en-US" smtClean="0"/>
-              <a:t>‹#›</a:t>
+              <a:pPr/>
+              <a:t>‹N°›</a:t>
             </a:fld>
             <a:endParaRPr lang="en-US"/>
           </a:p>
@@ -1873,7 +1891,7 @@
     </p:spTree>
     <p:extLst>
       <p:ext uri="{BB962C8B-B14F-4D97-AF65-F5344CB8AC3E}">
-        <p14:creationId xmlns:p14="http://schemas.microsoft.com/office/powerpoint/2010/main" val="2106617271"/>
+        <p14:creationId xmlns:p14="http://schemas.microsoft.com/office/powerpoint/2010/main" xmlns="" val="2106617271"/>
       </p:ext>
     </p:extLst>
   </p:cSld>
@@ -2099,7 +2117,8 @@
           <a:p>
             <a:fld id="{388BEFF6-CA1E-4F2C-AB17-C8AC986E5615}" type="datetimeFigureOut">
               <a:rPr lang="en-US" smtClean="0"/>
-              <a:t>4/2/2024</a:t>
+              <a:pPr/>
+              <a:t>4/7/2024</a:t>
             </a:fld>
             <a:endParaRPr lang="en-US"/>
           </a:p>
@@ -2141,7 +2160,8 @@
           <a:p>
             <a:fld id="{B2B78684-98AC-4705-8032-58D98476EAE5}" type="slidenum">
               <a:rPr lang="en-US" smtClean="0"/>
-              <a:t>‹#›</a:t>
+              <a:pPr/>
+              <a:t>‹N°›</a:t>
             </a:fld>
             <a:endParaRPr lang="en-US"/>
           </a:p>
@@ -2150,7 +2170,7 @@
     </p:spTree>
     <p:extLst>
       <p:ext uri="{BB962C8B-B14F-4D97-AF65-F5344CB8AC3E}">
-        <p14:creationId xmlns:p14="http://schemas.microsoft.com/office/powerpoint/2010/main" val="2943008422"/>
+        <p14:creationId xmlns:p14="http://schemas.microsoft.com/office/powerpoint/2010/main" xmlns="" val="2943008422"/>
       </p:ext>
     </p:extLst>
   </p:cSld>
@@ -2352,7 +2372,8 @@
           <a:p>
             <a:fld id="{388BEFF6-CA1E-4F2C-AB17-C8AC986E5615}" type="datetimeFigureOut">
               <a:rPr lang="en-US" smtClean="0"/>
-              <a:t>4/2/2024</a:t>
+              <a:pPr/>
+              <a:t>4/7/2024</a:t>
             </a:fld>
             <a:endParaRPr lang="en-US"/>
           </a:p>
@@ -2394,7 +2415,8 @@
           <a:p>
             <a:fld id="{B2B78684-98AC-4705-8032-58D98476EAE5}" type="slidenum">
               <a:rPr lang="en-US" smtClean="0"/>
-              <a:t>‹#›</a:t>
+              <a:pPr/>
+              <a:t>‹N°›</a:t>
             </a:fld>
             <a:endParaRPr lang="en-US"/>
           </a:p>
@@ -2403,7 +2425,7 @@
     </p:spTree>
     <p:extLst>
       <p:ext uri="{BB962C8B-B14F-4D97-AF65-F5344CB8AC3E}">
-        <p14:creationId xmlns:p14="http://schemas.microsoft.com/office/powerpoint/2010/main" val="3509189551"/>
+        <p14:creationId xmlns:p14="http://schemas.microsoft.com/office/powerpoint/2010/main" xmlns="" val="3509189551"/>
       </p:ext>
     </p:extLst>
   </p:cSld>
@@ -2565,7 +2587,8 @@
           <a:p>
             <a:fld id="{388BEFF6-CA1E-4F2C-AB17-C8AC986E5615}" type="datetimeFigureOut">
               <a:rPr lang="en-US" smtClean="0"/>
-              <a:t>4/2/2024</a:t>
+              <a:pPr/>
+              <a:t>4/7/2024</a:t>
             </a:fld>
             <a:endParaRPr lang="en-US"/>
           </a:p>
@@ -2643,7 +2666,8 @@
           <a:p>
             <a:fld id="{B2B78684-98AC-4705-8032-58D98476EAE5}" type="slidenum">
               <a:rPr lang="en-US" smtClean="0"/>
-              <a:t>‹#›</a:t>
+              <a:pPr/>
+              <a:t>‹N°›</a:t>
             </a:fld>
             <a:endParaRPr lang="en-US"/>
           </a:p>
@@ -2652,7 +2676,7 @@
     </p:spTree>
     <p:extLst>
       <p:ext uri="{BB962C8B-B14F-4D97-AF65-F5344CB8AC3E}">
-        <p14:creationId xmlns:p14="http://schemas.microsoft.com/office/powerpoint/2010/main" val="139519878"/>
+        <p14:creationId xmlns:p14="http://schemas.microsoft.com/office/powerpoint/2010/main" xmlns="" val="139519878"/>
       </p:ext>
     </p:extLst>
   </p:cSld>
@@ -4387,7 +4411,7 @@
     </p:spTree>
     <p:extLst>
       <p:ext uri="{BB962C8B-B14F-4D97-AF65-F5344CB8AC3E}">
-        <p14:creationId xmlns:p14="http://schemas.microsoft.com/office/powerpoint/2010/main" val="521620976"/>
+        <p14:creationId xmlns:p14="http://schemas.microsoft.com/office/powerpoint/2010/main" xmlns="" val="521620976"/>
       </p:ext>
     </p:extLst>
   </p:cSld>
@@ -4429,7 +4453,7 @@
         </p:nvSpPr>
         <p:spPr>
           <a:xfrm>
-            <a:off x="537579" y="629970"/>
+            <a:off x="572083" y="629970"/>
             <a:ext cx="2932018" cy="731520"/>
           </a:xfrm>
           <a:prstGeom prst="rect">
@@ -4467,14 +4491,14 @@
       </p:sp>
       <p:sp>
         <p:nvSpPr>
-          <p:cNvPr id="43" name="Rectangle 42"/>
+          <p:cNvPr id="44" name="Rectangle 43"/>
           <p:cNvSpPr/>
           <p:nvPr/>
         </p:nvSpPr>
         <p:spPr>
           <a:xfrm>
-            <a:off x="532238" y="4971265"/>
-            <a:ext cx="2926595" cy="731520"/>
+            <a:off x="4382637" y="2739372"/>
+            <a:ext cx="2932018" cy="731520"/>
           </a:xfrm>
           <a:prstGeom prst="rect">
             <a:avLst/>
@@ -4503,7 +4527,7 @@
             <a:pPr algn="ctr"/>
             <a:r>
               <a:rPr lang="en-US" dirty="0" err="1"/>
-              <a:t>loader_unrealthirdperson.c</a:t>
+              <a:t>screen_unrealthirdperson.c</a:t>
             </a:r>
             <a:endParaRPr lang="en-US" dirty="0" smtClean="0"/>
           </a:p>
@@ -4511,13 +4535,13 @@
       </p:sp>
       <p:sp>
         <p:nvSpPr>
-          <p:cNvPr id="44" name="Rectangle 43"/>
+          <p:cNvPr id="46" name="Rectangle 45"/>
           <p:cNvSpPr/>
           <p:nvPr/>
         </p:nvSpPr>
         <p:spPr>
           <a:xfrm>
-            <a:off x="526815" y="3990142"/>
+            <a:off x="563457" y="2743132"/>
             <a:ext cx="2932018" cy="731520"/>
           </a:xfrm>
           <a:prstGeom prst="rect">
@@ -4547,7 +4571,7 @@
             <a:pPr algn="ctr"/>
             <a:r>
               <a:rPr lang="en-US" dirty="0" err="1"/>
-              <a:t>screen_unrealthirdperson.c</a:t>
+              <a:t>game.c</a:t>
             </a:r>
             <a:endParaRPr lang="en-US" dirty="0" smtClean="0"/>
           </a:p>
@@ -4555,18 +4579,291 @@
       </p:sp>
       <p:sp>
         <p:nvSpPr>
-          <p:cNvPr id="46" name="Rectangle 45"/>
+          <p:cNvPr id="47" name="Rectangle 46"/>
           <p:cNvSpPr/>
           <p:nvPr/>
         </p:nvSpPr>
         <p:spPr>
           <a:xfrm>
-            <a:off x="537579" y="2053052"/>
-            <a:ext cx="2932018" cy="731520"/>
+            <a:off x="8542061" y="4275748"/>
+            <a:ext cx="2932018" cy="457200"/>
           </a:xfrm>
           <a:prstGeom prst="rect">
             <a:avLst/>
           </a:prstGeom>
+        </p:spPr>
+        <p:style>
+          <a:lnRef idx="2">
+            <a:schemeClr val="accent3">
+              <a:shade val="50000"/>
+            </a:schemeClr>
+          </a:lnRef>
+          <a:fillRef idx="1">
+            <a:schemeClr val="accent3"/>
+          </a:fillRef>
+          <a:effectRef idx="0">
+            <a:schemeClr val="accent3"/>
+          </a:effectRef>
+          <a:fontRef idx="minor">
+            <a:schemeClr val="lt1"/>
+          </a:fontRef>
+        </p:style>
+        <p:txBody>
+          <a:bodyPr rtlCol="0" anchor="ctr"/>
+          <a:lstStyle/>
+          <a:p>
+            <a:pPr algn="ctr"/>
+            <a:r>
+              <a:rPr lang="en-US" dirty="0" err="1" smtClean="0"/>
+              <a:t>assets.h</a:t>
+            </a:r>
+            <a:endParaRPr lang="en-US" dirty="0" smtClean="0"/>
+          </a:p>
+        </p:txBody>
+      </p:sp>
+      <p:sp>
+        <p:nvSpPr>
+          <p:cNvPr id="49" name="Rectangle 48"/>
+          <p:cNvSpPr/>
+          <p:nvPr/>
+        </p:nvSpPr>
+        <p:spPr>
+          <a:xfrm>
+            <a:off x="8526251" y="1833632"/>
+            <a:ext cx="2932018" cy="457200"/>
+          </a:xfrm>
+          <a:prstGeom prst="rect">
+            <a:avLst/>
+          </a:prstGeom>
+        </p:spPr>
+        <p:style>
+          <a:lnRef idx="2">
+            <a:schemeClr val="accent3">
+              <a:shade val="50000"/>
+            </a:schemeClr>
+          </a:lnRef>
+          <a:fillRef idx="1">
+            <a:schemeClr val="accent3"/>
+          </a:fillRef>
+          <a:effectRef idx="0">
+            <a:schemeClr val="accent3"/>
+          </a:effectRef>
+          <a:fontRef idx="minor">
+            <a:schemeClr val="lt1"/>
+          </a:fontRef>
+        </p:style>
+        <p:txBody>
+          <a:bodyPr rtlCol="0" anchor="ctr"/>
+          <a:lstStyle/>
+          <a:p>
+            <a:pPr algn="ctr"/>
+            <a:r>
+              <a:rPr lang="en-US" dirty="0" err="1" smtClean="0"/>
+              <a:t>control.h</a:t>
+            </a:r>
+            <a:endParaRPr lang="en-US" dirty="0" smtClean="0"/>
+          </a:p>
+        </p:txBody>
+      </p:sp>
+      <p:sp>
+        <p:nvSpPr>
+          <p:cNvPr id="50" name="Rectangle 49"/>
+          <p:cNvSpPr/>
+          <p:nvPr/>
+        </p:nvSpPr>
+        <p:spPr>
+          <a:xfrm>
+            <a:off x="8526251" y="1276510"/>
+            <a:ext cx="2932018" cy="457200"/>
+          </a:xfrm>
+          <a:prstGeom prst="rect">
+            <a:avLst/>
+          </a:prstGeom>
+        </p:spPr>
+        <p:style>
+          <a:lnRef idx="2">
+            <a:schemeClr val="accent3">
+              <a:shade val="50000"/>
+            </a:schemeClr>
+          </a:lnRef>
+          <a:fillRef idx="1">
+            <a:schemeClr val="accent3"/>
+          </a:fillRef>
+          <a:effectRef idx="0">
+            <a:schemeClr val="accent3"/>
+          </a:effectRef>
+          <a:fontRef idx="minor">
+            <a:schemeClr val="lt1"/>
+          </a:fontRef>
+        </p:style>
+        <p:txBody>
+          <a:bodyPr rtlCol="0" anchor="ctr"/>
+          <a:lstStyle/>
+          <a:p>
+            <a:pPr algn="ctr"/>
+            <a:r>
+              <a:rPr lang="en-US" dirty="0" err="1" smtClean="0"/>
+              <a:t>input.h</a:t>
+            </a:r>
+            <a:endParaRPr lang="en-US" dirty="0" smtClean="0"/>
+          </a:p>
+        </p:txBody>
+      </p:sp>
+      <p:sp>
+        <p:nvSpPr>
+          <p:cNvPr id="51" name="Rectangle 50"/>
+          <p:cNvSpPr/>
+          <p:nvPr/>
+        </p:nvSpPr>
+        <p:spPr>
+          <a:xfrm>
+            <a:off x="4386010" y="5234335"/>
+            <a:ext cx="2932018" cy="457200"/>
+          </a:xfrm>
+          <a:prstGeom prst="rect">
+            <a:avLst/>
+          </a:prstGeom>
+        </p:spPr>
+        <p:style>
+          <a:lnRef idx="2">
+            <a:schemeClr val="accent3">
+              <a:shade val="50000"/>
+            </a:schemeClr>
+          </a:lnRef>
+          <a:fillRef idx="1">
+            <a:schemeClr val="accent3"/>
+          </a:fillRef>
+          <a:effectRef idx="0">
+            <a:schemeClr val="accent3"/>
+          </a:effectRef>
+          <a:fontRef idx="minor">
+            <a:schemeClr val="lt1"/>
+          </a:fontRef>
+        </p:style>
+        <p:txBody>
+          <a:bodyPr rtlCol="0" anchor="ctr"/>
+          <a:lstStyle/>
+          <a:p>
+            <a:pPr algn="ctr"/>
+            <a:r>
+              <a:rPr lang="en-US" dirty="0" err="1" smtClean="0"/>
+              <a:t>screen_logo.h</a:t>
+            </a:r>
+            <a:endParaRPr lang="en-US" dirty="0" smtClean="0"/>
+          </a:p>
+        </p:txBody>
+      </p:sp>
+      <p:sp>
+        <p:nvSpPr>
+          <p:cNvPr id="52" name="Rectangle 51"/>
+          <p:cNvSpPr/>
+          <p:nvPr/>
+        </p:nvSpPr>
+        <p:spPr>
+          <a:xfrm>
+            <a:off x="8542061" y="4824916"/>
+            <a:ext cx="2932018" cy="457200"/>
+          </a:xfrm>
+          <a:prstGeom prst="rect">
+            <a:avLst/>
+          </a:prstGeom>
+        </p:spPr>
+        <p:style>
+          <a:lnRef idx="2">
+            <a:schemeClr val="accent3">
+              <a:shade val="50000"/>
+            </a:schemeClr>
+          </a:lnRef>
+          <a:fillRef idx="1">
+            <a:schemeClr val="accent3"/>
+          </a:fillRef>
+          <a:effectRef idx="0">
+            <a:schemeClr val="accent3"/>
+          </a:effectRef>
+          <a:fontRef idx="minor">
+            <a:schemeClr val="lt1"/>
+          </a:fontRef>
+        </p:style>
+        <p:txBody>
+          <a:bodyPr rtlCol="0" anchor="ctr"/>
+          <a:lstStyle/>
+          <a:p>
+            <a:pPr algn="ctr"/>
+            <a:r>
+              <a:rPr lang="en-US" dirty="0" err="1" smtClean="0"/>
+              <a:t>skybox.h</a:t>
+            </a:r>
+            <a:endParaRPr lang="en-US" dirty="0" smtClean="0"/>
+          </a:p>
+        </p:txBody>
+      </p:sp>
+      <p:sp>
+        <p:nvSpPr>
+          <p:cNvPr id="53" name="Rectangle 52"/>
+          <p:cNvSpPr/>
+          <p:nvPr/>
+        </p:nvSpPr>
+        <p:spPr>
+          <a:xfrm>
+            <a:off x="8526251" y="719388"/>
+            <a:ext cx="2932018" cy="457200"/>
+          </a:xfrm>
+          <a:prstGeom prst="rect">
+            <a:avLst/>
+          </a:prstGeom>
+        </p:spPr>
+        <p:style>
+          <a:lnRef idx="2">
+            <a:schemeClr val="accent3">
+              <a:shade val="50000"/>
+            </a:schemeClr>
+          </a:lnRef>
+          <a:fillRef idx="1">
+            <a:schemeClr val="accent3"/>
+          </a:fillRef>
+          <a:effectRef idx="0">
+            <a:schemeClr val="accent3"/>
+          </a:effectRef>
+          <a:fontRef idx="minor">
+            <a:schemeClr val="lt1"/>
+          </a:fontRef>
+        </p:style>
+        <p:txBody>
+          <a:bodyPr rtlCol="0" anchor="ctr"/>
+          <a:lstStyle/>
+          <a:p>
+            <a:pPr algn="ctr"/>
+            <a:r>
+              <a:rPr lang="en-US" dirty="0" err="1" smtClean="0"/>
+              <a:t>tick.h</a:t>
+            </a:r>
+            <a:endParaRPr lang="en-US" dirty="0" smtClean="0"/>
+          </a:p>
+        </p:txBody>
+      </p:sp>
+      <p:sp>
+        <p:nvSpPr>
+          <p:cNvPr id="54" name="Rectangle 53"/>
+          <p:cNvSpPr/>
+          <p:nvPr/>
+        </p:nvSpPr>
+        <p:spPr>
+          <a:xfrm>
+            <a:off x="173114" y="185417"/>
+            <a:ext cx="7607911" cy="1385688"/>
+          </a:xfrm>
+          <a:prstGeom prst="rect">
+            <a:avLst/>
+          </a:prstGeom>
+          <a:noFill/>
+          <a:ln>
+            <a:solidFill>
+              <a:schemeClr val="bg1">
+                <a:lumMod val="75000"/>
+              </a:schemeClr>
+            </a:solidFill>
+            <a:prstDash val="dash"/>
+          </a:ln>
         </p:spPr>
         <p:style>
           <a:lnRef idx="2">
@@ -4585,32 +4882,52 @@
           </a:fontRef>
         </p:style>
         <p:txBody>
-          <a:bodyPr rtlCol="0" anchor="ctr"/>
-          <a:lstStyle/>
-          <a:p>
-            <a:pPr algn="ctr"/>
-            <a:r>
-              <a:rPr lang="en-US" dirty="0" err="1"/>
-              <a:t>game.c</a:t>
-            </a:r>
-            <a:endParaRPr lang="en-US" dirty="0" smtClean="0"/>
-          </a:p>
-        </p:txBody>
-      </p:sp>
-      <p:sp>
-        <p:nvSpPr>
-          <p:cNvPr id="47" name="Rectangle 46"/>
+          <a:bodyPr rtlCol="0" anchor="t"/>
+          <a:lstStyle/>
+          <a:p>
+            <a:r>
+              <a:rPr lang="en-US" dirty="0" smtClean="0">
+                <a:solidFill>
+                  <a:schemeClr val="bg1">
+                    <a:lumMod val="65000"/>
+                  </a:schemeClr>
+                </a:solidFill>
+              </a:rPr>
+              <a:t>/standalone/desktop_win64</a:t>
+            </a:r>
+            <a:endParaRPr lang="en-US" dirty="0">
+              <a:solidFill>
+                <a:schemeClr val="bg1">
+                  <a:lumMod val="65000"/>
+                </a:schemeClr>
+              </a:solidFill>
+            </a:endParaRPr>
+          </a:p>
+        </p:txBody>
+      </p:sp>
+      <p:sp>
+        <p:nvSpPr>
+          <p:cNvPr id="55" name="Rectangle 54"/>
           <p:cNvSpPr/>
           <p:nvPr/>
         </p:nvSpPr>
         <p:spPr>
           <a:xfrm>
-            <a:off x="8110761" y="4370669"/>
-            <a:ext cx="2932018" cy="731520"/>
+            <a:off x="173114" y="1569023"/>
+            <a:ext cx="7607912" cy="4505722"/>
           </a:xfrm>
           <a:prstGeom prst="rect">
             <a:avLst/>
           </a:prstGeom>
+          <a:noFill/>
+          <a:ln>
+            <a:solidFill>
+              <a:schemeClr val="bg1">
+                <a:lumMod val="75000"/>
+              </a:schemeClr>
+            </a:solidFill>
+            <a:prstDash val="dash"/>
+          </a:ln>
         </p:spPr>
         <p:style>
           <a:lnRef idx="2">
@@ -4629,32 +4946,52 @@
           </a:fontRef>
         </p:style>
         <p:txBody>
-          <a:bodyPr rtlCol="0" anchor="ctr"/>
-          <a:lstStyle/>
-          <a:p>
-            <a:pPr algn="ctr"/>
-            <a:r>
-              <a:rPr lang="en-US" dirty="0" err="1"/>
-              <a:t>assets.c</a:t>
-            </a:r>
-            <a:endParaRPr lang="en-US" dirty="0" smtClean="0"/>
-          </a:p>
-        </p:txBody>
-      </p:sp>
-      <p:sp>
-        <p:nvSpPr>
-          <p:cNvPr id="49" name="Rectangle 48"/>
+          <a:bodyPr rtlCol="0" anchor="t"/>
+          <a:lstStyle/>
+          <a:p>
+            <a:r>
+              <a:rPr lang="en-US" dirty="0" smtClean="0">
+                <a:solidFill>
+                  <a:schemeClr val="bg1">
+                    <a:lumMod val="65000"/>
+                  </a:schemeClr>
+                </a:solidFill>
+              </a:rPr>
+              <a:t>/platform/game</a:t>
+            </a:r>
+            <a:endParaRPr lang="en-US" dirty="0">
+              <a:solidFill>
+                <a:schemeClr val="bg1">
+                  <a:lumMod val="65000"/>
+                </a:schemeClr>
+              </a:solidFill>
+            </a:endParaRPr>
+          </a:p>
+        </p:txBody>
+      </p:sp>
+      <p:sp>
+        <p:nvSpPr>
+          <p:cNvPr id="56" name="Rectangle 55"/>
           <p:cNvSpPr/>
           <p:nvPr/>
         </p:nvSpPr>
         <p:spPr>
           <a:xfrm>
-            <a:off x="8759153" y="3273493"/>
-            <a:ext cx="2932018" cy="731520"/>
+            <a:off x="7772400" y="185417"/>
+            <a:ext cx="4114800" cy="5889328"/>
           </a:xfrm>
           <a:prstGeom prst="rect">
             <a:avLst/>
           </a:prstGeom>
+          <a:noFill/>
+          <a:ln>
+            <a:solidFill>
+              <a:schemeClr val="bg1">
+                <a:lumMod val="75000"/>
+              </a:schemeClr>
+            </a:solidFill>
+            <a:prstDash val="dash"/>
+          </a:ln>
         </p:spPr>
         <p:style>
           <a:lnRef idx="2">
@@ -4673,28 +5010,335 @@
           </a:fontRef>
         </p:style>
         <p:txBody>
-          <a:bodyPr rtlCol="0" anchor="ctr"/>
-          <a:lstStyle/>
-          <a:p>
-            <a:pPr algn="ctr"/>
-            <a:r>
-              <a:rPr lang="en-US" dirty="0" err="1"/>
-              <a:t>control.c</a:t>
-            </a:r>
-            <a:endParaRPr lang="en-US" dirty="0" smtClean="0"/>
-          </a:p>
-        </p:txBody>
-      </p:sp>
-      <p:sp>
-        <p:nvSpPr>
-          <p:cNvPr id="50" name="Rectangle 49"/>
+          <a:bodyPr rtlCol="0" anchor="t"/>
+          <a:lstStyle/>
+          <a:p>
+            <a:r>
+              <a:rPr lang="en-US" dirty="0" smtClean="0">
+                <a:solidFill>
+                  <a:schemeClr val="bg1">
+                    <a:lumMod val="65000"/>
+                  </a:schemeClr>
+                </a:solidFill>
+              </a:rPr>
+              <a:t>/platform/engine</a:t>
+            </a:r>
+            <a:endParaRPr lang="en-US" dirty="0">
+              <a:solidFill>
+                <a:schemeClr val="bg1">
+                  <a:lumMod val="65000"/>
+                </a:schemeClr>
+              </a:solidFill>
+            </a:endParaRPr>
+          </a:p>
+        </p:txBody>
+      </p:sp>
+      <p:cxnSp>
+        <p:nvCxnSpPr>
+          <p:cNvPr id="57" name="Straight Connector 56"/>
+          <p:cNvCxnSpPr>
+            <a:stCxn id="32" idx="0"/>
+            <a:endCxn id="31" idx="2"/>
+          </p:cNvCxnSpPr>
+          <p:nvPr/>
+        </p:nvCxnSpPr>
+        <p:spPr>
+          <a:xfrm rot="5400000" flipH="1" flipV="1">
+            <a:off x="1657826" y="1730253"/>
+            <a:ext cx="749028" cy="11503"/>
+          </a:xfrm>
+          <a:prstGeom prst="line">
+            <a:avLst/>
+          </a:prstGeom>
+          <a:ln>
+            <a:headEnd type="triangle" w="med" len="med"/>
+            <a:tailEnd type="none" w="med" len="med"/>
+          </a:ln>
+        </p:spPr>
+        <p:style>
+          <a:lnRef idx="2">
+            <a:schemeClr val="accent3"/>
+          </a:lnRef>
+          <a:fillRef idx="0">
+            <a:schemeClr val="accent3"/>
+          </a:fillRef>
+          <a:effectRef idx="1">
+            <a:schemeClr val="accent3"/>
+          </a:effectRef>
+          <a:fontRef idx="minor">
+            <a:schemeClr val="tx1"/>
+          </a:fontRef>
+        </p:style>
+      </p:cxnSp>
+      <p:cxnSp>
+        <p:nvCxnSpPr>
+          <p:cNvPr id="60" name="Straight Connector 59"/>
+          <p:cNvCxnSpPr>
+            <a:stCxn id="51" idx="1"/>
+            <a:endCxn id="46" idx="3"/>
+          </p:cNvCxnSpPr>
+          <p:nvPr/>
+        </p:nvCxnSpPr>
+        <p:spPr>
+          <a:xfrm rot="10800000">
+            <a:off x="3495476" y="3108893"/>
+            <a:ext cx="890535" cy="2354043"/>
+          </a:xfrm>
+          <a:prstGeom prst="line">
+            <a:avLst/>
+          </a:prstGeom>
+          <a:ln>
+            <a:headEnd type="triangle" w="med" len="med"/>
+            <a:tailEnd type="none" w="med" len="med"/>
+          </a:ln>
+        </p:spPr>
+        <p:style>
+          <a:lnRef idx="2">
+            <a:schemeClr val="accent3"/>
+          </a:lnRef>
+          <a:fillRef idx="0">
+            <a:schemeClr val="accent3"/>
+          </a:fillRef>
+          <a:effectRef idx="1">
+            <a:schemeClr val="accent3"/>
+          </a:effectRef>
+          <a:fontRef idx="minor">
+            <a:schemeClr val="tx1"/>
+          </a:fontRef>
+        </p:style>
+      </p:cxnSp>
+      <p:cxnSp>
+        <p:nvCxnSpPr>
+          <p:cNvPr id="61" name="Straight Connector 60"/>
+          <p:cNvCxnSpPr>
+            <a:stCxn id="44" idx="1"/>
+            <a:endCxn id="46" idx="3"/>
+          </p:cNvCxnSpPr>
+          <p:nvPr/>
+        </p:nvCxnSpPr>
+        <p:spPr>
+          <a:xfrm rot="10800000" flipV="1">
+            <a:off x="3495475" y="3105132"/>
+            <a:ext cx="887162" cy="3760"/>
+          </a:xfrm>
+          <a:prstGeom prst="line">
+            <a:avLst/>
+          </a:prstGeom>
+          <a:ln>
+            <a:headEnd type="triangle" w="med" len="med"/>
+            <a:tailEnd type="none" w="med" len="med"/>
+          </a:ln>
+        </p:spPr>
+        <p:style>
+          <a:lnRef idx="2">
+            <a:schemeClr val="accent3"/>
+          </a:lnRef>
+          <a:fillRef idx="0">
+            <a:schemeClr val="accent3"/>
+          </a:fillRef>
+          <a:effectRef idx="1">
+            <a:schemeClr val="accent3"/>
+          </a:effectRef>
+          <a:fontRef idx="minor">
+            <a:schemeClr val="tx1"/>
+          </a:fontRef>
+        </p:style>
+      </p:cxnSp>
+      <p:cxnSp>
+        <p:nvCxnSpPr>
+          <p:cNvPr id="62" name="Straight Connector 61"/>
+          <p:cNvCxnSpPr>
+            <a:stCxn id="53" idx="1"/>
+            <a:endCxn id="44" idx="3"/>
+          </p:cNvCxnSpPr>
+          <p:nvPr/>
+        </p:nvCxnSpPr>
+        <p:spPr>
+          <a:xfrm rot="10800000" flipV="1">
+            <a:off x="7314655" y="947988"/>
+            <a:ext cx="1211596" cy="2157144"/>
+          </a:xfrm>
+          <a:prstGeom prst="line">
+            <a:avLst/>
+          </a:prstGeom>
+          <a:ln>
+            <a:headEnd type="triangle" w="med" len="med"/>
+            <a:tailEnd type="none" w="med" len="med"/>
+          </a:ln>
+        </p:spPr>
+        <p:style>
+          <a:lnRef idx="2">
+            <a:schemeClr val="accent3"/>
+          </a:lnRef>
+          <a:fillRef idx="0">
+            <a:schemeClr val="accent3"/>
+          </a:fillRef>
+          <a:effectRef idx="1">
+            <a:schemeClr val="accent3"/>
+          </a:effectRef>
+          <a:fontRef idx="minor">
+            <a:schemeClr val="tx1"/>
+          </a:fontRef>
+        </p:style>
+      </p:cxnSp>
+      <p:cxnSp>
+        <p:nvCxnSpPr>
+          <p:cNvPr id="63" name="Straight Connector 62"/>
+          <p:cNvCxnSpPr>
+            <a:stCxn id="47" idx="1"/>
+            <a:endCxn id="38" idx="3"/>
+          </p:cNvCxnSpPr>
+          <p:nvPr/>
+        </p:nvCxnSpPr>
+        <p:spPr>
+          <a:xfrm rot="10800000">
+            <a:off x="7303153" y="3964898"/>
+            <a:ext cx="1238908" cy="539450"/>
+          </a:xfrm>
+          <a:prstGeom prst="line">
+            <a:avLst/>
+          </a:prstGeom>
+          <a:ln>
+            <a:headEnd type="triangle" w="med" len="med"/>
+            <a:tailEnd type="none" w="med" len="med"/>
+          </a:ln>
+        </p:spPr>
+        <p:style>
+          <a:lnRef idx="2">
+            <a:schemeClr val="accent3"/>
+          </a:lnRef>
+          <a:fillRef idx="0">
+            <a:schemeClr val="accent3"/>
+          </a:fillRef>
+          <a:effectRef idx="1">
+            <a:schemeClr val="accent3"/>
+          </a:effectRef>
+          <a:fontRef idx="minor">
+            <a:schemeClr val="tx1"/>
+          </a:fontRef>
+        </p:style>
+      </p:cxnSp>
+      <p:cxnSp>
+        <p:nvCxnSpPr>
+          <p:cNvPr id="64" name="Straight Connector 63"/>
+          <p:cNvCxnSpPr>
+            <a:stCxn id="52" idx="1"/>
+            <a:endCxn id="38" idx="3"/>
+          </p:cNvCxnSpPr>
+          <p:nvPr/>
+        </p:nvCxnSpPr>
+        <p:spPr>
+          <a:xfrm rot="10800000">
+            <a:off x="7303153" y="3964898"/>
+            <a:ext cx="1238908" cy="1088618"/>
+          </a:xfrm>
+          <a:prstGeom prst="line">
+            <a:avLst/>
+          </a:prstGeom>
+          <a:ln>
+            <a:headEnd type="triangle" w="med" len="med"/>
+            <a:tailEnd type="none" w="med" len="med"/>
+          </a:ln>
+        </p:spPr>
+        <p:style>
+          <a:lnRef idx="2">
+            <a:schemeClr val="accent3"/>
+          </a:lnRef>
+          <a:fillRef idx="0">
+            <a:schemeClr val="accent3"/>
+          </a:fillRef>
+          <a:effectRef idx="1">
+            <a:schemeClr val="accent3"/>
+          </a:effectRef>
+          <a:fontRef idx="minor">
+            <a:schemeClr val="tx1"/>
+          </a:fontRef>
+        </p:style>
+      </p:cxnSp>
+      <p:cxnSp>
+        <p:nvCxnSpPr>
+          <p:cNvPr id="68" name="Straight Connector 67"/>
+          <p:cNvCxnSpPr>
+            <a:stCxn id="49" idx="1"/>
+            <a:endCxn id="44" idx="3"/>
+          </p:cNvCxnSpPr>
+          <p:nvPr/>
+        </p:nvCxnSpPr>
+        <p:spPr>
+          <a:xfrm rot="10800000" flipV="1">
+            <a:off x="7314655" y="2062232"/>
+            <a:ext cx="1211596" cy="1042900"/>
+          </a:xfrm>
+          <a:prstGeom prst="line">
+            <a:avLst/>
+          </a:prstGeom>
+          <a:ln>
+            <a:headEnd type="triangle" w="med" len="med"/>
+            <a:tailEnd type="none" w="med" len="med"/>
+          </a:ln>
+        </p:spPr>
+        <p:style>
+          <a:lnRef idx="2">
+            <a:schemeClr val="accent3"/>
+          </a:lnRef>
+          <a:fillRef idx="0">
+            <a:schemeClr val="accent3"/>
+          </a:fillRef>
+          <a:effectRef idx="1">
+            <a:schemeClr val="accent3"/>
+          </a:effectRef>
+          <a:fontRef idx="minor">
+            <a:schemeClr val="tx1"/>
+          </a:fontRef>
+        </p:style>
+      </p:cxnSp>
+      <p:cxnSp>
+        <p:nvCxnSpPr>
+          <p:cNvPr id="71" name="Straight Connector 70"/>
+          <p:cNvCxnSpPr>
+            <a:stCxn id="50" idx="1"/>
+            <a:endCxn id="44" idx="3"/>
+          </p:cNvCxnSpPr>
+          <p:nvPr/>
+        </p:nvCxnSpPr>
+        <p:spPr>
+          <a:xfrm rot="10800000" flipV="1">
+            <a:off x="7314655" y="1505110"/>
+            <a:ext cx="1211596" cy="1600022"/>
+          </a:xfrm>
+          <a:prstGeom prst="line">
+            <a:avLst/>
+          </a:prstGeom>
+          <a:ln>
+            <a:headEnd type="triangle" w="med" len="med"/>
+            <a:tailEnd type="none" w="med" len="med"/>
+          </a:ln>
+        </p:spPr>
+        <p:style>
+          <a:lnRef idx="2">
+            <a:schemeClr val="accent3"/>
+          </a:lnRef>
+          <a:fillRef idx="0">
+            <a:schemeClr val="accent3"/>
+          </a:fillRef>
+          <a:effectRef idx="1">
+            <a:schemeClr val="accent3"/>
+          </a:effectRef>
+          <a:fontRef idx="minor">
+            <a:schemeClr val="tx1"/>
+          </a:fontRef>
+        </p:style>
+      </p:cxnSp>
+      <p:sp>
+        <p:nvSpPr>
+          <p:cNvPr id="75" name="Rectangle 74"/>
           <p:cNvSpPr/>
           <p:nvPr/>
         </p:nvSpPr>
         <p:spPr>
           <a:xfrm>
-            <a:off x="8759153" y="2435860"/>
-            <a:ext cx="2932018" cy="731520"/>
+            <a:off x="425618" y="6203003"/>
+            <a:ext cx="182880" cy="182880"/>
           </a:xfrm>
           <a:prstGeom prst="rect">
             <a:avLst/>
@@ -4721,28 +5365,475 @@
           <a:lstStyle/>
           <a:p>
             <a:pPr algn="ctr"/>
-            <a:r>
-              <a:rPr lang="en-US" dirty="0" err="1"/>
-              <a:t>input.c</a:t>
+            <a:endParaRPr lang="en-US" dirty="0"/>
+          </a:p>
+        </p:txBody>
+      </p:sp>
+      <p:sp>
+        <p:nvSpPr>
+          <p:cNvPr id="76" name="Rectangle 75"/>
+          <p:cNvSpPr/>
+          <p:nvPr/>
+        </p:nvSpPr>
+        <p:spPr>
+          <a:xfrm>
+            <a:off x="420627" y="6462633"/>
+            <a:ext cx="182880" cy="182880"/>
+          </a:xfrm>
+          <a:prstGeom prst="rect">
+            <a:avLst/>
+          </a:prstGeom>
+        </p:spPr>
+        <p:style>
+          <a:lnRef idx="2">
+            <a:schemeClr val="accent3">
+              <a:shade val="50000"/>
+            </a:schemeClr>
+          </a:lnRef>
+          <a:fillRef idx="1">
+            <a:schemeClr val="accent3"/>
+          </a:fillRef>
+          <a:effectRef idx="0">
+            <a:schemeClr val="accent3"/>
+          </a:effectRef>
+          <a:fontRef idx="minor">
+            <a:schemeClr val="lt1"/>
+          </a:fontRef>
+        </p:style>
+        <p:txBody>
+          <a:bodyPr rtlCol="0" anchor="ctr"/>
+          <a:lstStyle/>
+          <a:p>
+            <a:pPr algn="ctr"/>
+            <a:endParaRPr lang="en-US" dirty="0"/>
+          </a:p>
+        </p:txBody>
+      </p:sp>
+      <p:sp>
+        <p:nvSpPr>
+          <p:cNvPr id="77" name="TextBox 76"/>
+          <p:cNvSpPr txBox="1"/>
+          <p:nvPr/>
+        </p:nvSpPr>
+        <p:spPr>
+          <a:xfrm>
+            <a:off x="581888" y="6074745"/>
+            <a:ext cx="4310982" cy="646331"/>
+          </a:xfrm>
+          <a:prstGeom prst="rect">
+            <a:avLst/>
+          </a:prstGeom>
+          <a:noFill/>
+        </p:spPr>
+        <p:txBody>
+          <a:bodyPr wrap="square" rtlCol="0">
+            <a:spAutoFit/>
+          </a:bodyPr>
+          <a:lstStyle/>
+          <a:p>
+            <a:pPr>
+              <a:lnSpc>
+                <a:spcPct val="150000"/>
+              </a:lnSpc>
+            </a:pPr>
+            <a:r>
+              <a:rPr lang="en-US" sz="1200" dirty="0" smtClean="0"/>
+              <a:t>: </a:t>
+            </a:r>
+            <a:r>
+              <a:rPr lang="en-US" sz="1200" dirty="0" err="1" smtClean="0"/>
+              <a:t>impl</a:t>
+            </a:r>
+            <a:endParaRPr lang="en-US" sz="1200" dirty="0" smtClean="0"/>
+          </a:p>
+          <a:p>
+            <a:pPr>
+              <a:lnSpc>
+                <a:spcPct val="150000"/>
+              </a:lnSpc>
+            </a:pPr>
+            <a:r>
+              <a:rPr lang="en-US" sz="1200" dirty="0" smtClean="0"/>
+              <a:t>: header	           : runtime</a:t>
+            </a:r>
+            <a:endParaRPr lang="en-US" sz="1200" dirty="0"/>
+          </a:p>
+        </p:txBody>
+      </p:sp>
+      <p:sp>
+        <p:nvSpPr>
+          <p:cNvPr id="78" name="Rectangle 77"/>
+          <p:cNvSpPr/>
+          <p:nvPr/>
+        </p:nvSpPr>
+        <p:spPr>
+          <a:xfrm>
+            <a:off x="1695798" y="6458713"/>
+            <a:ext cx="182880" cy="182880"/>
+          </a:xfrm>
+          <a:prstGeom prst="rect">
+            <a:avLst/>
+          </a:prstGeom>
+        </p:spPr>
+        <p:style>
+          <a:lnRef idx="2">
+            <a:schemeClr val="accent2">
+              <a:shade val="50000"/>
+            </a:schemeClr>
+          </a:lnRef>
+          <a:fillRef idx="1">
+            <a:schemeClr val="accent2"/>
+          </a:fillRef>
+          <a:effectRef idx="0">
+            <a:schemeClr val="accent2"/>
+          </a:effectRef>
+          <a:fontRef idx="minor">
+            <a:schemeClr val="lt1"/>
+          </a:fontRef>
+        </p:style>
+        <p:txBody>
+          <a:bodyPr rtlCol="0" anchor="ctr"/>
+          <a:lstStyle/>
+          <a:p>
+            <a:pPr algn="ctr"/>
+            <a:endParaRPr lang="en-US" dirty="0"/>
+          </a:p>
+        </p:txBody>
+      </p:sp>
+      <p:sp>
+        <p:nvSpPr>
+          <p:cNvPr id="79" name="TextBox 78"/>
+          <p:cNvSpPr txBox="1"/>
+          <p:nvPr/>
+        </p:nvSpPr>
+        <p:spPr>
+          <a:xfrm>
+            <a:off x="3358347" y="6160653"/>
+            <a:ext cx="5286893" cy="369332"/>
+          </a:xfrm>
+          <a:prstGeom prst="rect">
+            <a:avLst/>
+          </a:prstGeom>
+          <a:noFill/>
+        </p:spPr>
+        <p:txBody>
+          <a:bodyPr wrap="square" rtlCol="0">
+            <a:spAutoFit/>
+          </a:bodyPr>
+          <a:lstStyle/>
+          <a:p>
+            <a:pPr algn="ctr"/>
+            <a:r>
+              <a:rPr lang="en-US" b="1" dirty="0" smtClean="0"/>
+              <a:t>Objects Diagram</a:t>
+            </a:r>
+            <a:endParaRPr lang="en-US" b="1" dirty="0"/>
+          </a:p>
+        </p:txBody>
+      </p:sp>
+      <p:sp>
+        <p:nvSpPr>
+          <p:cNvPr id="29" name="Rectangle 28"/>
+          <p:cNvSpPr/>
+          <p:nvPr/>
+        </p:nvSpPr>
+        <p:spPr>
+          <a:xfrm>
+            <a:off x="8523381" y="2390754"/>
+            <a:ext cx="2932018" cy="457200"/>
+          </a:xfrm>
+          <a:prstGeom prst="rect">
+            <a:avLst/>
+          </a:prstGeom>
+        </p:spPr>
+        <p:style>
+          <a:lnRef idx="2">
+            <a:schemeClr val="accent3">
+              <a:shade val="50000"/>
+            </a:schemeClr>
+          </a:lnRef>
+          <a:fillRef idx="1">
+            <a:schemeClr val="accent3"/>
+          </a:fillRef>
+          <a:effectRef idx="0">
+            <a:schemeClr val="accent3"/>
+          </a:effectRef>
+          <a:fontRef idx="minor">
+            <a:schemeClr val="lt1"/>
+          </a:fontRef>
+        </p:style>
+        <p:txBody>
+          <a:bodyPr rtlCol="0" anchor="ctr"/>
+          <a:lstStyle/>
+          <a:p>
+            <a:pPr algn="ctr"/>
+            <a:r>
+              <a:rPr lang="en-US" dirty="0" err="1" smtClean="0"/>
+              <a:t>camera.h</a:t>
             </a:r>
             <a:endParaRPr lang="en-US" dirty="0" smtClean="0"/>
           </a:p>
         </p:txBody>
       </p:sp>
-      <p:sp>
-        <p:nvSpPr>
-          <p:cNvPr id="51" name="Rectangle 50"/>
+      <p:cxnSp>
+        <p:nvCxnSpPr>
+          <p:cNvPr id="30" name="Straight Connector 67"/>
+          <p:cNvCxnSpPr>
+            <a:stCxn id="29" idx="1"/>
+            <a:endCxn id="44" idx="3"/>
+          </p:cNvCxnSpPr>
+          <p:nvPr/>
+        </p:nvCxnSpPr>
+        <p:spPr>
+          <a:xfrm rot="10800000" flipV="1">
+            <a:off x="7314655" y="2619354"/>
+            <a:ext cx="1208726" cy="485778"/>
+          </a:xfrm>
+          <a:prstGeom prst="line">
+            <a:avLst/>
+          </a:prstGeom>
+          <a:ln>
+            <a:headEnd type="triangle" w="med" len="med"/>
+            <a:tailEnd type="none" w="med" len="med"/>
+          </a:ln>
+        </p:spPr>
+        <p:style>
+          <a:lnRef idx="2">
+            <a:schemeClr val="accent3"/>
+          </a:lnRef>
+          <a:fillRef idx="0">
+            <a:schemeClr val="accent3"/>
+          </a:fillRef>
+          <a:effectRef idx="1">
+            <a:schemeClr val="accent3"/>
+          </a:effectRef>
+          <a:fontRef idx="minor">
+            <a:schemeClr val="tx1"/>
+          </a:fontRef>
+        </p:style>
+      </p:cxnSp>
+      <p:sp>
+        <p:nvSpPr>
+          <p:cNvPr id="32" name="Rectangle 31"/>
           <p:cNvSpPr/>
           <p:nvPr/>
         </p:nvSpPr>
         <p:spPr>
           <a:xfrm>
-            <a:off x="8060885" y="446663"/>
-            <a:ext cx="2932018" cy="731520"/>
+            <a:off x="560580" y="2110518"/>
+            <a:ext cx="2932018" cy="457200"/>
           </a:xfrm>
           <a:prstGeom prst="rect">
             <a:avLst/>
           </a:prstGeom>
+        </p:spPr>
+        <p:style>
+          <a:lnRef idx="2">
+            <a:schemeClr val="accent3">
+              <a:shade val="50000"/>
+            </a:schemeClr>
+          </a:lnRef>
+          <a:fillRef idx="1">
+            <a:schemeClr val="accent3"/>
+          </a:fillRef>
+          <a:effectRef idx="0">
+            <a:schemeClr val="accent3"/>
+          </a:effectRef>
+          <a:fontRef idx="minor">
+            <a:schemeClr val="lt1"/>
+          </a:fontRef>
+        </p:style>
+        <p:txBody>
+          <a:bodyPr rtlCol="0" anchor="ctr"/>
+          <a:lstStyle/>
+          <a:p>
+            <a:pPr algn="ctr"/>
+            <a:r>
+              <a:rPr lang="en-US" dirty="0" err="1" smtClean="0"/>
+              <a:t>game.h</a:t>
+            </a:r>
+            <a:endParaRPr lang="en-US" dirty="0" smtClean="0"/>
+          </a:p>
+        </p:txBody>
+      </p:sp>
+      <p:cxnSp>
+        <p:nvCxnSpPr>
+          <p:cNvPr id="34" name="Straight Connector 56"/>
+          <p:cNvCxnSpPr>
+            <a:stCxn id="32" idx="2"/>
+            <a:endCxn id="46" idx="0"/>
+          </p:cNvCxnSpPr>
+          <p:nvPr/>
+        </p:nvCxnSpPr>
+        <p:spPr>
+          <a:xfrm rot="16200000" flipH="1">
+            <a:off x="1940320" y="2653986"/>
+            <a:ext cx="175414" cy="2877"/>
+          </a:xfrm>
+          <a:prstGeom prst="line">
+            <a:avLst/>
+          </a:prstGeom>
+          <a:ln>
+            <a:headEnd type="triangle" w="med" len="med"/>
+            <a:tailEnd type="none" w="med" len="med"/>
+          </a:ln>
+        </p:spPr>
+        <p:style>
+          <a:lnRef idx="2">
+            <a:schemeClr val="accent3"/>
+          </a:lnRef>
+          <a:fillRef idx="0">
+            <a:schemeClr val="accent3"/>
+          </a:fillRef>
+          <a:effectRef idx="1">
+            <a:schemeClr val="accent3"/>
+          </a:effectRef>
+          <a:fontRef idx="minor">
+            <a:schemeClr val="tx1"/>
+          </a:fontRef>
+        </p:style>
+      </p:cxnSp>
+      <p:sp>
+        <p:nvSpPr>
+          <p:cNvPr id="48" name="Rectangle 47"/>
+          <p:cNvSpPr/>
+          <p:nvPr/>
+        </p:nvSpPr>
+        <p:spPr>
+          <a:xfrm>
+            <a:off x="8815217" y="3384379"/>
+            <a:ext cx="2932018" cy="457200"/>
+          </a:xfrm>
+          <a:prstGeom prst="rect">
+            <a:avLst/>
+          </a:prstGeom>
+        </p:spPr>
+        <p:style>
+          <a:lnRef idx="2">
+            <a:schemeClr val="accent3">
+              <a:shade val="50000"/>
+            </a:schemeClr>
+          </a:lnRef>
+          <a:fillRef idx="1">
+            <a:schemeClr val="accent3"/>
+          </a:fillRef>
+          <a:effectRef idx="0">
+            <a:schemeClr val="accent3"/>
+          </a:effectRef>
+          <a:fontRef idx="minor">
+            <a:schemeClr val="lt1"/>
+          </a:fontRef>
+        </p:style>
+        <p:txBody>
+          <a:bodyPr rtlCol="0" anchor="ctr"/>
+          <a:lstStyle/>
+          <a:p>
+            <a:pPr algn="ctr"/>
+            <a:r>
+              <a:rPr lang="en-US" dirty="0" err="1" smtClean="0"/>
+              <a:t>gameobject.h</a:t>
+            </a:r>
+            <a:endParaRPr lang="en-US" dirty="0" smtClean="0"/>
+          </a:p>
+        </p:txBody>
+      </p:sp>
+      <p:cxnSp>
+        <p:nvCxnSpPr>
+          <p:cNvPr id="58" name="Straight Connector 67"/>
+          <p:cNvCxnSpPr>
+            <a:stCxn id="48" idx="1"/>
+            <a:endCxn id="44" idx="3"/>
+          </p:cNvCxnSpPr>
+          <p:nvPr/>
+        </p:nvCxnSpPr>
+        <p:spPr>
+          <a:xfrm rot="10800000">
+            <a:off x="7314655" y="3105133"/>
+            <a:ext cx="1500562" cy="507847"/>
+          </a:xfrm>
+          <a:prstGeom prst="line">
+            <a:avLst/>
+          </a:prstGeom>
+          <a:ln>
+            <a:headEnd type="triangle" w="med" len="med"/>
+            <a:tailEnd type="none" w="med" len="med"/>
+          </a:ln>
+        </p:spPr>
+        <p:style>
+          <a:lnRef idx="2">
+            <a:schemeClr val="accent3"/>
+          </a:lnRef>
+          <a:fillRef idx="0">
+            <a:schemeClr val="accent3"/>
+          </a:fillRef>
+          <a:effectRef idx="1">
+            <a:schemeClr val="accent3"/>
+          </a:effectRef>
+          <a:fontRef idx="minor">
+            <a:schemeClr val="tx1"/>
+          </a:fontRef>
+        </p:style>
+      </p:cxnSp>
+      <p:cxnSp>
+        <p:nvCxnSpPr>
+          <p:cNvPr id="66" name="Straight Connector 67"/>
+          <p:cNvCxnSpPr>
+            <a:stCxn id="48" idx="1"/>
+            <a:endCxn id="44" idx="3"/>
+          </p:cNvCxnSpPr>
+          <p:nvPr/>
+        </p:nvCxnSpPr>
+        <p:spPr>
+          <a:xfrm rot="10800000">
+            <a:off x="7314655" y="3105133"/>
+            <a:ext cx="1500562" cy="507847"/>
+          </a:xfrm>
+          <a:prstGeom prst="line">
+            <a:avLst/>
+          </a:prstGeom>
+          <a:ln>
+            <a:headEnd type="triangle" w="med" len="med"/>
+            <a:tailEnd type="none" w="med" len="med"/>
+          </a:ln>
+        </p:spPr>
+        <p:style>
+          <a:lnRef idx="2">
+            <a:schemeClr val="accent3"/>
+          </a:lnRef>
+          <a:fillRef idx="0">
+            <a:schemeClr val="accent3"/>
+          </a:fillRef>
+          <a:effectRef idx="1">
+            <a:schemeClr val="accent3"/>
+          </a:effectRef>
+          <a:fontRef idx="minor">
+            <a:schemeClr val="tx1"/>
+          </a:fontRef>
+        </p:style>
+      </p:cxnSp>
+      <p:sp>
+        <p:nvSpPr>
+          <p:cNvPr id="36" name="Rectangle 35"/>
+          <p:cNvSpPr/>
+          <p:nvPr/>
+        </p:nvSpPr>
+        <p:spPr>
+          <a:xfrm>
+            <a:off x="3881887" y="4761781"/>
+            <a:ext cx="3896266" cy="1310088"/>
+          </a:xfrm>
+          <a:prstGeom prst="rect">
+            <a:avLst/>
+          </a:prstGeom>
+          <a:noFill/>
+          <a:ln>
+            <a:solidFill>
+              <a:schemeClr val="bg1">
+                <a:lumMod val="75000"/>
+              </a:schemeClr>
+            </a:solidFill>
+            <a:prstDash val="dash"/>
+          </a:ln>
         </p:spPr>
         <p:style>
           <a:lnRef idx="2">
@@ -4761,32 +5852,50 @@
           </a:fontRef>
         </p:style>
         <p:txBody>
-          <a:bodyPr rtlCol="0" anchor="ctr"/>
-          <a:lstStyle/>
-          <a:p>
-            <a:pPr algn="ctr"/>
-            <a:r>
-              <a:rPr lang="en-US" dirty="0" err="1"/>
-              <a:t>screen_logo.c</a:t>
-            </a:r>
-            <a:endParaRPr lang="en-US" dirty="0" smtClean="0"/>
-          </a:p>
-        </p:txBody>
-      </p:sp>
-      <p:sp>
-        <p:nvSpPr>
-          <p:cNvPr id="52" name="Rectangle 51"/>
+          <a:bodyPr rtlCol="0" anchor="t"/>
+          <a:lstStyle/>
+          <a:p>
+            <a:r>
+              <a:rPr lang="en-US" dirty="0" smtClean="0">
+                <a:solidFill>
+                  <a:schemeClr val="bg1">
+                    <a:lumMod val="65000"/>
+                  </a:schemeClr>
+                </a:solidFill>
+              </a:rPr>
+              <a:t>/platform/engine</a:t>
+            </a:r>
+            <a:endParaRPr lang="en-US" dirty="0">
+              <a:solidFill>
+                <a:schemeClr val="bg1">
+                  <a:lumMod val="65000"/>
+                </a:schemeClr>
+              </a:solidFill>
+            </a:endParaRPr>
+          </a:p>
+        </p:txBody>
+      </p:sp>
+      <p:sp>
+        <p:nvSpPr>
+          <p:cNvPr id="37" name="Rectangle 36"/>
           <p:cNvSpPr/>
           <p:nvPr/>
         </p:nvSpPr>
         <p:spPr>
           <a:xfrm>
-            <a:off x="8110761" y="5204495"/>
-            <a:ext cx="2932018" cy="731520"/>
+            <a:off x="7631516" y="4779034"/>
+            <a:ext cx="313414" cy="1293962"/>
           </a:xfrm>
           <a:prstGeom prst="rect">
             <a:avLst/>
           </a:prstGeom>
+          <a:solidFill>
+            <a:schemeClr val="bg1"/>
+          </a:solidFill>
+          <a:ln>
+            <a:noFill/>
+            <a:prstDash val="dash"/>
+          </a:ln>
         </p:spPr>
         <p:style>
           <a:lnRef idx="2">
@@ -4805,27 +5914,28 @@
           </a:fontRef>
         </p:style>
         <p:txBody>
-          <a:bodyPr rtlCol="0" anchor="ctr"/>
-          <a:lstStyle/>
-          <a:p>
-            <a:pPr algn="ctr"/>
-            <a:r>
-              <a:rPr lang="en-US" dirty="0" err="1"/>
-              <a:t>skybox.c</a:t>
-            </a:r>
-            <a:endParaRPr lang="en-US" dirty="0" smtClean="0"/>
-          </a:p>
-        </p:txBody>
-      </p:sp>
-      <p:sp>
-        <p:nvSpPr>
-          <p:cNvPr id="53" name="Rectangle 52"/>
+          <a:bodyPr rtlCol="0" anchor="t"/>
+          <a:lstStyle/>
+          <a:p>
+            <a:endParaRPr lang="en-US" dirty="0">
+              <a:solidFill>
+                <a:schemeClr val="bg1">
+                  <a:lumMod val="65000"/>
+                </a:schemeClr>
+              </a:solidFill>
+            </a:endParaRPr>
+          </a:p>
+        </p:txBody>
+      </p:sp>
+      <p:sp>
+        <p:nvSpPr>
+          <p:cNvPr id="38" name="Rectangle 37"/>
           <p:cNvSpPr/>
           <p:nvPr/>
         </p:nvSpPr>
         <p:spPr>
           <a:xfrm>
-            <a:off x="8759153" y="1625118"/>
+            <a:off x="4371135" y="3599138"/>
             <a:ext cx="2932018" cy="731520"/>
           </a:xfrm>
           <a:prstGeom prst="rect">
@@ -4854,719 +5964,26 @@
           <a:p>
             <a:pPr algn="ctr"/>
             <a:r>
-              <a:rPr lang="en-US" dirty="0" err="1"/>
-              <a:t>tick.c</a:t>
+              <a:rPr lang="en-US" dirty="0" err="1" smtClean="0"/>
+              <a:t>loader_unrealthirdperson.c</a:t>
             </a:r>
             <a:endParaRPr lang="en-US" dirty="0" smtClean="0"/>
-          </a:p>
-        </p:txBody>
-      </p:sp>
-      <p:sp>
-        <p:nvSpPr>
-          <p:cNvPr id="54" name="Rectangle 53"/>
-          <p:cNvSpPr/>
-          <p:nvPr/>
-        </p:nvSpPr>
-        <p:spPr>
-          <a:xfrm>
-            <a:off x="173115" y="185417"/>
-            <a:ext cx="5820358" cy="1385688"/>
-          </a:xfrm>
-          <a:prstGeom prst="rect">
-            <a:avLst/>
-          </a:prstGeom>
-          <a:noFill/>
-          <a:ln>
-            <a:solidFill>
-              <a:schemeClr val="bg1">
-                <a:lumMod val="75000"/>
-              </a:schemeClr>
-            </a:solidFill>
-            <a:prstDash val="dash"/>
-          </a:ln>
-        </p:spPr>
-        <p:style>
-          <a:lnRef idx="2">
-            <a:schemeClr val="accent1">
-              <a:shade val="50000"/>
-            </a:schemeClr>
-          </a:lnRef>
-          <a:fillRef idx="1">
-            <a:schemeClr val="accent1"/>
-          </a:fillRef>
-          <a:effectRef idx="0">
-            <a:schemeClr val="accent1"/>
-          </a:effectRef>
-          <a:fontRef idx="minor">
-            <a:schemeClr val="lt1"/>
-          </a:fontRef>
-        </p:style>
-        <p:txBody>
-          <a:bodyPr rtlCol="0" anchor="t"/>
-          <a:lstStyle/>
-          <a:p>
-            <a:r>
-              <a:rPr lang="en-US" dirty="0" smtClean="0">
-                <a:solidFill>
-                  <a:schemeClr val="bg1">
-                    <a:lumMod val="65000"/>
-                  </a:schemeClr>
-                </a:solidFill>
-              </a:rPr>
-              <a:t>/standalone/desktop_win64</a:t>
-            </a:r>
-            <a:endParaRPr lang="en-US" dirty="0">
-              <a:solidFill>
-                <a:schemeClr val="bg1">
-                  <a:lumMod val="65000"/>
-                </a:schemeClr>
-              </a:solidFill>
-            </a:endParaRPr>
-          </a:p>
-        </p:txBody>
-      </p:sp>
-      <p:sp>
-        <p:nvSpPr>
-          <p:cNvPr id="55" name="Rectangle 54"/>
-          <p:cNvSpPr/>
-          <p:nvPr/>
-        </p:nvSpPr>
-        <p:spPr>
-          <a:xfrm>
-            <a:off x="173114" y="1569023"/>
-            <a:ext cx="5820361" cy="4505722"/>
-          </a:xfrm>
-          <a:prstGeom prst="rect">
-            <a:avLst/>
-          </a:prstGeom>
-          <a:noFill/>
-          <a:ln>
-            <a:solidFill>
-              <a:schemeClr val="bg1">
-                <a:lumMod val="75000"/>
-              </a:schemeClr>
-            </a:solidFill>
-            <a:prstDash val="dash"/>
-          </a:ln>
-        </p:spPr>
-        <p:style>
-          <a:lnRef idx="2">
-            <a:schemeClr val="accent1">
-              <a:shade val="50000"/>
-            </a:schemeClr>
-          </a:lnRef>
-          <a:fillRef idx="1">
-            <a:schemeClr val="accent1"/>
-          </a:fillRef>
-          <a:effectRef idx="0">
-            <a:schemeClr val="accent1"/>
-          </a:effectRef>
-          <a:fontRef idx="minor">
-            <a:schemeClr val="lt1"/>
-          </a:fontRef>
-        </p:style>
-        <p:txBody>
-          <a:bodyPr rtlCol="0" anchor="t"/>
-          <a:lstStyle/>
-          <a:p>
-            <a:r>
-              <a:rPr lang="en-US" dirty="0" smtClean="0">
-                <a:solidFill>
-                  <a:schemeClr val="bg1">
-                    <a:lumMod val="65000"/>
-                  </a:schemeClr>
-                </a:solidFill>
-              </a:rPr>
-              <a:t>/platform/game</a:t>
-            </a:r>
-            <a:endParaRPr lang="en-US" dirty="0">
-              <a:solidFill>
-                <a:schemeClr val="bg1">
-                  <a:lumMod val="65000"/>
-                </a:schemeClr>
-              </a:solidFill>
-            </a:endParaRPr>
-          </a:p>
-        </p:txBody>
-      </p:sp>
-      <p:sp>
-        <p:nvSpPr>
-          <p:cNvPr id="56" name="Rectangle 55"/>
-          <p:cNvSpPr/>
-          <p:nvPr/>
-        </p:nvSpPr>
-        <p:spPr>
-          <a:xfrm>
-            <a:off x="5993476" y="185417"/>
-            <a:ext cx="5893724" cy="5889328"/>
-          </a:xfrm>
-          <a:prstGeom prst="rect">
-            <a:avLst/>
-          </a:prstGeom>
-          <a:noFill/>
-          <a:ln>
-            <a:solidFill>
-              <a:schemeClr val="bg1">
-                <a:lumMod val="75000"/>
-              </a:schemeClr>
-            </a:solidFill>
-            <a:prstDash val="dash"/>
-          </a:ln>
-        </p:spPr>
-        <p:style>
-          <a:lnRef idx="2">
-            <a:schemeClr val="accent1">
-              <a:shade val="50000"/>
-            </a:schemeClr>
-          </a:lnRef>
-          <a:fillRef idx="1">
-            <a:schemeClr val="accent1"/>
-          </a:fillRef>
-          <a:effectRef idx="0">
-            <a:schemeClr val="accent1"/>
-          </a:effectRef>
-          <a:fontRef idx="minor">
-            <a:schemeClr val="lt1"/>
-          </a:fontRef>
-        </p:style>
-        <p:txBody>
-          <a:bodyPr rtlCol="0" anchor="t"/>
-          <a:lstStyle/>
-          <a:p>
-            <a:r>
-              <a:rPr lang="en-US" dirty="0" smtClean="0">
-                <a:solidFill>
-                  <a:schemeClr val="bg1">
-                    <a:lumMod val="65000"/>
-                  </a:schemeClr>
-                </a:solidFill>
-              </a:rPr>
-              <a:t>/platform/engine</a:t>
-            </a:r>
-            <a:endParaRPr lang="en-US" dirty="0">
-              <a:solidFill>
-                <a:schemeClr val="bg1">
-                  <a:lumMod val="65000"/>
-                </a:schemeClr>
-              </a:solidFill>
-            </a:endParaRPr>
           </a:p>
         </p:txBody>
       </p:sp>
       <p:cxnSp>
         <p:nvCxnSpPr>
-          <p:cNvPr id="57" name="Straight Connector 56"/>
+          <p:cNvPr id="41" name="Straight Connector 67"/>
           <p:cNvCxnSpPr>
-            <a:stCxn id="46" idx="0"/>
-            <a:endCxn id="31" idx="2"/>
+            <a:stCxn id="48" idx="1"/>
+            <a:endCxn id="38" idx="3"/>
           </p:cNvCxnSpPr>
           <p:nvPr/>
         </p:nvCxnSpPr>
         <p:spPr>
-          <a:xfrm flipV="1">
-            <a:off x="2003588" y="1361490"/>
-            <a:ext cx="0" cy="691562"/>
-          </a:xfrm>
-          <a:prstGeom prst="line">
-            <a:avLst/>
-          </a:prstGeom>
-          <a:ln>
-            <a:headEnd type="triangle" w="med" len="med"/>
-            <a:tailEnd type="none" w="med" len="med"/>
-          </a:ln>
-        </p:spPr>
-        <p:style>
-          <a:lnRef idx="2">
-            <a:schemeClr val="accent3"/>
-          </a:lnRef>
-          <a:fillRef idx="0">
-            <a:schemeClr val="accent3"/>
-          </a:fillRef>
-          <a:effectRef idx="1">
-            <a:schemeClr val="accent3"/>
-          </a:effectRef>
-          <a:fontRef idx="minor">
-            <a:schemeClr val="tx1"/>
-          </a:fontRef>
-        </p:style>
-      </p:cxnSp>
-      <p:cxnSp>
-        <p:nvCxnSpPr>
-          <p:cNvPr id="60" name="Straight Connector 59"/>
-          <p:cNvCxnSpPr>
-            <a:stCxn id="51" idx="1"/>
-            <a:endCxn id="46" idx="3"/>
-          </p:cNvCxnSpPr>
-          <p:nvPr/>
-        </p:nvCxnSpPr>
-        <p:spPr>
-          <a:xfrm flipH="1">
-            <a:off x="3469597" y="812423"/>
-            <a:ext cx="4591288" cy="1606389"/>
-          </a:xfrm>
-          <a:prstGeom prst="line">
-            <a:avLst/>
-          </a:prstGeom>
-          <a:ln>
-            <a:headEnd type="triangle" w="med" len="med"/>
-            <a:tailEnd type="none" w="med" len="med"/>
-          </a:ln>
-        </p:spPr>
-        <p:style>
-          <a:lnRef idx="2">
-            <a:schemeClr val="accent3"/>
-          </a:lnRef>
-          <a:fillRef idx="0">
-            <a:schemeClr val="accent3"/>
-          </a:fillRef>
-          <a:effectRef idx="1">
-            <a:schemeClr val="accent3"/>
-          </a:effectRef>
-          <a:fontRef idx="minor">
-            <a:schemeClr val="tx1"/>
-          </a:fontRef>
-        </p:style>
-      </p:cxnSp>
-      <p:cxnSp>
-        <p:nvCxnSpPr>
-          <p:cNvPr id="61" name="Straight Connector 60"/>
-          <p:cNvCxnSpPr>
-            <a:stCxn id="44" idx="0"/>
-            <a:endCxn id="46" idx="2"/>
-          </p:cNvCxnSpPr>
-          <p:nvPr/>
-        </p:nvCxnSpPr>
-        <p:spPr>
-          <a:xfrm flipV="1">
-            <a:off x="1992824" y="2784572"/>
-            <a:ext cx="10764" cy="1205570"/>
-          </a:xfrm>
-          <a:prstGeom prst="line">
-            <a:avLst/>
-          </a:prstGeom>
-          <a:ln>
-            <a:headEnd type="triangle" w="med" len="med"/>
-            <a:tailEnd type="none" w="med" len="med"/>
-          </a:ln>
-        </p:spPr>
-        <p:style>
-          <a:lnRef idx="2">
-            <a:schemeClr val="accent3"/>
-          </a:lnRef>
-          <a:fillRef idx="0">
-            <a:schemeClr val="accent3"/>
-          </a:fillRef>
-          <a:effectRef idx="1">
-            <a:schemeClr val="accent3"/>
-          </a:effectRef>
-          <a:fontRef idx="minor">
-            <a:schemeClr val="tx1"/>
-          </a:fontRef>
-        </p:style>
-      </p:cxnSp>
-      <p:cxnSp>
-        <p:nvCxnSpPr>
-          <p:cNvPr id="62" name="Straight Connector 61"/>
-          <p:cNvCxnSpPr>
-            <a:stCxn id="53" idx="1"/>
-            <a:endCxn id="44" idx="3"/>
-          </p:cNvCxnSpPr>
-          <p:nvPr/>
-        </p:nvCxnSpPr>
-        <p:spPr>
-          <a:xfrm flipH="1">
-            <a:off x="3458833" y="1990878"/>
-            <a:ext cx="5300320" cy="2365024"/>
-          </a:xfrm>
-          <a:prstGeom prst="line">
-            <a:avLst/>
-          </a:prstGeom>
-          <a:ln>
-            <a:headEnd type="triangle" w="med" len="med"/>
-            <a:tailEnd type="none" w="med" len="med"/>
-          </a:ln>
-        </p:spPr>
-        <p:style>
-          <a:lnRef idx="2">
-            <a:schemeClr val="accent3"/>
-          </a:lnRef>
-          <a:fillRef idx="0">
-            <a:schemeClr val="accent3"/>
-          </a:fillRef>
-          <a:effectRef idx="1">
-            <a:schemeClr val="accent3"/>
-          </a:effectRef>
-          <a:fontRef idx="minor">
-            <a:schemeClr val="tx1"/>
-          </a:fontRef>
-        </p:style>
-      </p:cxnSp>
-      <p:cxnSp>
-        <p:nvCxnSpPr>
-          <p:cNvPr id="63" name="Straight Connector 62"/>
-          <p:cNvCxnSpPr>
-            <a:stCxn id="47" idx="1"/>
-            <a:endCxn id="43" idx="3"/>
-          </p:cNvCxnSpPr>
-          <p:nvPr/>
-        </p:nvCxnSpPr>
-        <p:spPr>
-          <a:xfrm flipH="1">
-            <a:off x="3458833" y="4736429"/>
-            <a:ext cx="4651928" cy="600596"/>
-          </a:xfrm>
-          <a:prstGeom prst="line">
-            <a:avLst/>
-          </a:prstGeom>
-          <a:ln>
-            <a:headEnd type="triangle" w="med" len="med"/>
-            <a:tailEnd type="none" w="med" len="med"/>
-          </a:ln>
-        </p:spPr>
-        <p:style>
-          <a:lnRef idx="2">
-            <a:schemeClr val="accent3"/>
-          </a:lnRef>
-          <a:fillRef idx="0">
-            <a:schemeClr val="accent3"/>
-          </a:fillRef>
-          <a:effectRef idx="1">
-            <a:schemeClr val="accent3"/>
-          </a:effectRef>
-          <a:fontRef idx="minor">
-            <a:schemeClr val="tx1"/>
-          </a:fontRef>
-        </p:style>
-      </p:cxnSp>
-      <p:cxnSp>
-        <p:nvCxnSpPr>
-          <p:cNvPr id="64" name="Straight Connector 63"/>
-          <p:cNvCxnSpPr>
-            <a:stCxn id="52" idx="1"/>
-            <a:endCxn id="43" idx="3"/>
-          </p:cNvCxnSpPr>
-          <p:nvPr/>
-        </p:nvCxnSpPr>
-        <p:spPr>
-          <a:xfrm flipH="1" flipV="1">
-            <a:off x="3458833" y="5337025"/>
-            <a:ext cx="4651928" cy="233230"/>
-          </a:xfrm>
-          <a:prstGeom prst="line">
-            <a:avLst/>
-          </a:prstGeom>
-          <a:ln>
-            <a:headEnd type="triangle" w="med" len="med"/>
-            <a:tailEnd type="none" w="med" len="med"/>
-          </a:ln>
-        </p:spPr>
-        <p:style>
-          <a:lnRef idx="2">
-            <a:schemeClr val="accent3"/>
-          </a:lnRef>
-          <a:fillRef idx="0">
-            <a:schemeClr val="accent3"/>
-          </a:fillRef>
-          <a:effectRef idx="1">
-            <a:schemeClr val="accent3"/>
-          </a:effectRef>
-          <a:fontRef idx="minor">
-            <a:schemeClr val="tx1"/>
-          </a:fontRef>
-        </p:style>
-      </p:cxnSp>
-      <p:cxnSp>
-        <p:nvCxnSpPr>
-          <p:cNvPr id="68" name="Straight Connector 67"/>
-          <p:cNvCxnSpPr>
-            <a:stCxn id="49" idx="1"/>
-            <a:endCxn id="44" idx="3"/>
-          </p:cNvCxnSpPr>
-          <p:nvPr/>
-        </p:nvCxnSpPr>
-        <p:spPr>
-          <a:xfrm flipH="1">
-            <a:off x="3458833" y="3639253"/>
-            <a:ext cx="5300320" cy="716649"/>
-          </a:xfrm>
-          <a:prstGeom prst="line">
-            <a:avLst/>
-          </a:prstGeom>
-          <a:ln>
-            <a:headEnd type="triangle" w="med" len="med"/>
-            <a:tailEnd type="none" w="med" len="med"/>
-          </a:ln>
-        </p:spPr>
-        <p:style>
-          <a:lnRef idx="2">
-            <a:schemeClr val="accent3"/>
-          </a:lnRef>
-          <a:fillRef idx="0">
-            <a:schemeClr val="accent3"/>
-          </a:fillRef>
-          <a:effectRef idx="1">
-            <a:schemeClr val="accent3"/>
-          </a:effectRef>
-          <a:fontRef idx="minor">
-            <a:schemeClr val="tx1"/>
-          </a:fontRef>
-        </p:style>
-      </p:cxnSp>
-      <p:cxnSp>
-        <p:nvCxnSpPr>
-          <p:cNvPr id="71" name="Straight Connector 70"/>
-          <p:cNvCxnSpPr>
-            <a:stCxn id="50" idx="1"/>
-            <a:endCxn id="44" idx="3"/>
-          </p:cNvCxnSpPr>
-          <p:nvPr/>
-        </p:nvCxnSpPr>
-        <p:spPr>
-          <a:xfrm flipH="1">
-            <a:off x="3458833" y="2801620"/>
-            <a:ext cx="5300320" cy="1554282"/>
-          </a:xfrm>
-          <a:prstGeom prst="line">
-            <a:avLst/>
-          </a:prstGeom>
-          <a:ln>
-            <a:headEnd type="triangle" w="med" len="med"/>
-            <a:tailEnd type="none" w="med" len="med"/>
-          </a:ln>
-        </p:spPr>
-        <p:style>
-          <a:lnRef idx="2">
-            <a:schemeClr val="accent3"/>
-          </a:lnRef>
-          <a:fillRef idx="0">
-            <a:schemeClr val="accent3"/>
-          </a:fillRef>
-          <a:effectRef idx="1">
-            <a:schemeClr val="accent3"/>
-          </a:effectRef>
-          <a:fontRef idx="minor">
-            <a:schemeClr val="tx1"/>
-          </a:fontRef>
-        </p:style>
-      </p:cxnSp>
-      <p:sp>
-        <p:nvSpPr>
-          <p:cNvPr id="75" name="Rectangle 74"/>
-          <p:cNvSpPr/>
-          <p:nvPr/>
-        </p:nvSpPr>
-        <p:spPr>
-          <a:xfrm>
-            <a:off x="425618" y="6203003"/>
-            <a:ext cx="182880" cy="182880"/>
-          </a:xfrm>
-          <a:prstGeom prst="rect">
-            <a:avLst/>
-          </a:prstGeom>
-        </p:spPr>
-        <p:style>
-          <a:lnRef idx="2">
-            <a:schemeClr val="accent1">
-              <a:shade val="50000"/>
-            </a:schemeClr>
-          </a:lnRef>
-          <a:fillRef idx="1">
-            <a:schemeClr val="accent1"/>
-          </a:fillRef>
-          <a:effectRef idx="0">
-            <a:schemeClr val="accent1"/>
-          </a:effectRef>
-          <a:fontRef idx="minor">
-            <a:schemeClr val="lt1"/>
-          </a:fontRef>
-        </p:style>
-        <p:txBody>
-          <a:bodyPr rtlCol="0" anchor="ctr"/>
-          <a:lstStyle/>
-          <a:p>
-            <a:pPr algn="ctr"/>
-            <a:endParaRPr lang="en-US" dirty="0"/>
-          </a:p>
-        </p:txBody>
-      </p:sp>
-      <p:sp>
-        <p:nvSpPr>
-          <p:cNvPr id="76" name="Rectangle 75"/>
-          <p:cNvSpPr/>
-          <p:nvPr/>
-        </p:nvSpPr>
-        <p:spPr>
-          <a:xfrm>
-            <a:off x="420627" y="6462633"/>
-            <a:ext cx="182880" cy="182880"/>
-          </a:xfrm>
-          <a:prstGeom prst="rect">
-            <a:avLst/>
-          </a:prstGeom>
-        </p:spPr>
-        <p:style>
-          <a:lnRef idx="2">
-            <a:schemeClr val="accent3">
-              <a:shade val="50000"/>
-            </a:schemeClr>
-          </a:lnRef>
-          <a:fillRef idx="1">
-            <a:schemeClr val="accent3"/>
-          </a:fillRef>
-          <a:effectRef idx="0">
-            <a:schemeClr val="accent3"/>
-          </a:effectRef>
-          <a:fontRef idx="minor">
-            <a:schemeClr val="lt1"/>
-          </a:fontRef>
-        </p:style>
-        <p:txBody>
-          <a:bodyPr rtlCol="0" anchor="ctr"/>
-          <a:lstStyle/>
-          <a:p>
-            <a:pPr algn="ctr"/>
-            <a:endParaRPr lang="en-US" dirty="0"/>
-          </a:p>
-        </p:txBody>
-      </p:sp>
-      <p:sp>
-        <p:nvSpPr>
-          <p:cNvPr id="77" name="TextBox 76"/>
-          <p:cNvSpPr txBox="1"/>
-          <p:nvPr/>
-        </p:nvSpPr>
-        <p:spPr>
-          <a:xfrm>
-            <a:off x="581888" y="6074745"/>
-            <a:ext cx="4310982" cy="646331"/>
-          </a:xfrm>
-          <a:prstGeom prst="rect">
-            <a:avLst/>
-          </a:prstGeom>
-          <a:noFill/>
-        </p:spPr>
-        <p:txBody>
-          <a:bodyPr wrap="square" rtlCol="0">
-            <a:spAutoFit/>
-          </a:bodyPr>
-          <a:lstStyle/>
-          <a:p>
-            <a:pPr>
-              <a:lnSpc>
-                <a:spcPct val="150000"/>
-              </a:lnSpc>
-            </a:pPr>
-            <a:r>
-              <a:rPr lang="en-US" sz="1200" dirty="0" smtClean="0"/>
-              <a:t>: source</a:t>
-            </a:r>
-          </a:p>
-          <a:p>
-            <a:pPr>
-              <a:lnSpc>
-                <a:spcPct val="150000"/>
-              </a:lnSpc>
-            </a:pPr>
-            <a:r>
-              <a:rPr lang="en-US" sz="1200" dirty="0" smtClean="0"/>
-              <a:t>: binary	           : runtime</a:t>
-            </a:r>
-            <a:endParaRPr lang="en-US" sz="1200" dirty="0"/>
-          </a:p>
-        </p:txBody>
-      </p:sp>
-      <p:sp>
-        <p:nvSpPr>
-          <p:cNvPr id="78" name="Rectangle 77"/>
-          <p:cNvSpPr/>
-          <p:nvPr/>
-        </p:nvSpPr>
-        <p:spPr>
-          <a:xfrm>
-            <a:off x="1695798" y="6458713"/>
-            <a:ext cx="182880" cy="182880"/>
-          </a:xfrm>
-          <a:prstGeom prst="rect">
-            <a:avLst/>
-          </a:prstGeom>
-        </p:spPr>
-        <p:style>
-          <a:lnRef idx="2">
-            <a:schemeClr val="accent2">
-              <a:shade val="50000"/>
-            </a:schemeClr>
-          </a:lnRef>
-          <a:fillRef idx="1">
-            <a:schemeClr val="accent2"/>
-          </a:fillRef>
-          <a:effectRef idx="0">
-            <a:schemeClr val="accent2"/>
-          </a:effectRef>
-          <a:fontRef idx="minor">
-            <a:schemeClr val="lt1"/>
-          </a:fontRef>
-        </p:style>
-        <p:txBody>
-          <a:bodyPr rtlCol="0" anchor="ctr"/>
-          <a:lstStyle/>
-          <a:p>
-            <a:pPr algn="ctr"/>
-            <a:endParaRPr lang="en-US" dirty="0"/>
-          </a:p>
-        </p:txBody>
-      </p:sp>
-      <p:sp>
-        <p:nvSpPr>
-          <p:cNvPr id="79" name="TextBox 78"/>
-          <p:cNvSpPr txBox="1"/>
-          <p:nvPr/>
-        </p:nvSpPr>
-        <p:spPr>
-          <a:xfrm>
-            <a:off x="3358347" y="6160653"/>
-            <a:ext cx="5286893" cy="369332"/>
-          </a:xfrm>
-          <a:prstGeom prst="rect">
-            <a:avLst/>
-          </a:prstGeom>
-          <a:noFill/>
-        </p:spPr>
-        <p:txBody>
-          <a:bodyPr wrap="square" rtlCol="0">
-            <a:spAutoFit/>
-          </a:bodyPr>
-          <a:lstStyle/>
-          <a:p>
-            <a:pPr algn="ctr"/>
-            <a:r>
-              <a:rPr lang="en-US" b="1" dirty="0" smtClean="0"/>
-              <a:t>Objects</a:t>
-            </a:r>
-            <a:r>
-              <a:rPr lang="en-US" b="1" dirty="0" smtClean="0"/>
-              <a:t> </a:t>
-            </a:r>
-            <a:r>
-              <a:rPr lang="en-US" b="1" dirty="0" smtClean="0"/>
-              <a:t>Diagram</a:t>
-            </a:r>
-            <a:endParaRPr lang="en-US" b="1" dirty="0"/>
-          </a:p>
-        </p:txBody>
-      </p:sp>
-      <p:cxnSp>
-        <p:nvCxnSpPr>
-          <p:cNvPr id="80" name="Straight Connector 79"/>
-          <p:cNvCxnSpPr>
-            <a:stCxn id="43" idx="0"/>
-            <a:endCxn id="44" idx="2"/>
-          </p:cNvCxnSpPr>
-          <p:nvPr/>
-        </p:nvCxnSpPr>
-        <p:spPr>
-          <a:xfrm flipH="1" flipV="1">
-            <a:off x="1992824" y="4721662"/>
-            <a:ext cx="2712" cy="249603"/>
+          <a:xfrm rot="10800000" flipV="1">
+            <a:off x="7303153" y="3612978"/>
+            <a:ext cx="1512064" cy="351919"/>
           </a:xfrm>
           <a:prstGeom prst="line">
             <a:avLst/>
@@ -5594,7 +6011,7 @@
     </p:spTree>
     <p:extLst>
       <p:ext uri="{BB962C8B-B14F-4D97-AF65-F5344CB8AC3E}">
-        <p14:creationId xmlns:p14="http://schemas.microsoft.com/office/powerpoint/2010/main" val="511600952"/>
+        <p14:creationId xmlns:p14="http://schemas.microsoft.com/office/powerpoint/2010/main" xmlns="" val="511600952"/>
       </p:ext>
     </p:extLst>
   </p:cSld>
@@ -5654,7 +6071,7 @@
     </a:clrScheme>
     <a:fontScheme name="Office">
       <a:majorFont>
-        <a:latin typeface="Calibri Light" panose="020F0302020204030204"/>
+        <a:latin typeface="Calibri Light"/>
         <a:ea typeface=""/>
         <a:cs typeface=""/>
         <a:font script="Jpan" typeface="游ゴシック Light"/>
@@ -5689,7 +6106,7 @@
         <a:font script="Geor" typeface="Sylfaen"/>
       </a:majorFont>
       <a:minorFont>
-        <a:latin typeface="Calibri" panose="020F0502020204030204"/>
+        <a:latin typeface="Calibri"/>
         <a:ea typeface=""/>
         <a:cs typeface=""/>
         <a:font script="Jpan" typeface="游ゴシック"/>
@@ -5866,7 +6283,7 @@
   <a:extraClrSchemeLst/>
   <a:extLst>
     <a:ext uri="{05A4C25C-085E-4340-85A3-A5531E510DB2}">
-      <thm15:themeFamily xmlns:thm15="http://schemas.microsoft.com/office/thememl/2012/main" name="Office Theme" id="{62F939B6-93AF-4DB8-9C6B-D6C7DFDC589F}" vid="{4A3C46E8-61CC-4603-A589-7422A47A8E4A}"/>
+      <thm15:themeFamily xmlns:thm15="http://schemas.microsoft.com/office/thememl/2012/main" xmlns="" name="Office Theme" id="{62F939B6-93AF-4DB8-9C6B-D6C7DFDC589F}" vid="{4A3C46E8-61CC-4603-A589-7422A47A8E4A}"/>
     </a:ext>
   </a:extLst>
 </a:theme>

</xml_diff>